<commit_message>
Version del 12 de Septiembre
</commit_message>
<xml_diff>
--- a/Presentación1.pptx
+++ b/Presentación1.pptx
@@ -10,7 +10,18 @@
     <p:sldId id="259" r:id="rId4"/>
     <p:sldId id="258" r:id="rId5"/>
     <p:sldId id="260" r:id="rId6"/>
-    <p:sldId id="261" r:id="rId7"/>
+    <p:sldId id="267" r:id="rId7"/>
+    <p:sldId id="266" r:id="rId8"/>
+    <p:sldId id="261" r:id="rId9"/>
+    <p:sldId id="262" r:id="rId10"/>
+    <p:sldId id="263" r:id="rId11"/>
+    <p:sldId id="264" r:id="rId12"/>
+    <p:sldId id="265" r:id="rId13"/>
+    <p:sldId id="268" r:id="rId14"/>
+    <p:sldId id="269" r:id="rId15"/>
+    <p:sldId id="270" r:id="rId16"/>
+    <p:sldId id="271" r:id="rId17"/>
+    <p:sldId id="272" r:id="rId18"/>
   </p:sldIdLst>
   <p:sldSz cx="12192000" cy="6858000"/>
   <p:notesSz cx="6858000" cy="9144000"/>
@@ -266,7 +277,7 @@
           <a:p>
             <a:fld id="{F42B13DB-78C3-41F4-B8AD-F2B9EFFC1885}" type="datetimeFigureOut">
               <a:rPr lang="es-AR" smtClean="0"/>
-              <a:t>3/9/2018</a:t>
+              <a:t>12/9/2018</a:t>
             </a:fld>
             <a:endParaRPr lang="es-AR"/>
           </a:p>
@@ -466,7 +477,7 @@
           <a:p>
             <a:fld id="{F42B13DB-78C3-41F4-B8AD-F2B9EFFC1885}" type="datetimeFigureOut">
               <a:rPr lang="es-AR" smtClean="0"/>
-              <a:t>3/9/2018</a:t>
+              <a:t>12/9/2018</a:t>
             </a:fld>
             <a:endParaRPr lang="es-AR"/>
           </a:p>
@@ -676,7 +687,7 @@
           <a:p>
             <a:fld id="{F42B13DB-78C3-41F4-B8AD-F2B9EFFC1885}" type="datetimeFigureOut">
               <a:rPr lang="es-AR" smtClean="0"/>
-              <a:t>3/9/2018</a:t>
+              <a:t>12/9/2018</a:t>
             </a:fld>
             <a:endParaRPr lang="es-AR"/>
           </a:p>
@@ -876,7 +887,7 @@
           <a:p>
             <a:fld id="{F42B13DB-78C3-41F4-B8AD-F2B9EFFC1885}" type="datetimeFigureOut">
               <a:rPr lang="es-AR" smtClean="0"/>
-              <a:t>3/9/2018</a:t>
+              <a:t>12/9/2018</a:t>
             </a:fld>
             <a:endParaRPr lang="es-AR"/>
           </a:p>
@@ -1152,7 +1163,7 @@
           <a:p>
             <a:fld id="{F42B13DB-78C3-41F4-B8AD-F2B9EFFC1885}" type="datetimeFigureOut">
               <a:rPr lang="es-AR" smtClean="0"/>
-              <a:t>3/9/2018</a:t>
+              <a:t>12/9/2018</a:t>
             </a:fld>
             <a:endParaRPr lang="es-AR"/>
           </a:p>
@@ -1420,7 +1431,7 @@
           <a:p>
             <a:fld id="{F42B13DB-78C3-41F4-B8AD-F2B9EFFC1885}" type="datetimeFigureOut">
               <a:rPr lang="es-AR" smtClean="0"/>
-              <a:t>3/9/2018</a:t>
+              <a:t>12/9/2018</a:t>
             </a:fld>
             <a:endParaRPr lang="es-AR"/>
           </a:p>
@@ -1835,7 +1846,7 @@
           <a:p>
             <a:fld id="{F42B13DB-78C3-41F4-B8AD-F2B9EFFC1885}" type="datetimeFigureOut">
               <a:rPr lang="es-AR" smtClean="0"/>
-              <a:t>3/9/2018</a:t>
+              <a:t>12/9/2018</a:t>
             </a:fld>
             <a:endParaRPr lang="es-AR"/>
           </a:p>
@@ -1977,7 +1988,7 @@
           <a:p>
             <a:fld id="{F42B13DB-78C3-41F4-B8AD-F2B9EFFC1885}" type="datetimeFigureOut">
               <a:rPr lang="es-AR" smtClean="0"/>
-              <a:t>3/9/2018</a:t>
+              <a:t>12/9/2018</a:t>
             </a:fld>
             <a:endParaRPr lang="es-AR"/>
           </a:p>
@@ -2090,7 +2101,7 @@
           <a:p>
             <a:fld id="{F42B13DB-78C3-41F4-B8AD-F2B9EFFC1885}" type="datetimeFigureOut">
               <a:rPr lang="es-AR" smtClean="0"/>
-              <a:t>3/9/2018</a:t>
+              <a:t>12/9/2018</a:t>
             </a:fld>
             <a:endParaRPr lang="es-AR"/>
           </a:p>
@@ -2403,7 +2414,7 @@
           <a:p>
             <a:fld id="{F42B13DB-78C3-41F4-B8AD-F2B9EFFC1885}" type="datetimeFigureOut">
               <a:rPr lang="es-AR" smtClean="0"/>
-              <a:t>3/9/2018</a:t>
+              <a:t>12/9/2018</a:t>
             </a:fld>
             <a:endParaRPr lang="es-AR"/>
           </a:p>
@@ -2692,7 +2703,7 @@
           <a:p>
             <a:fld id="{F42B13DB-78C3-41F4-B8AD-F2B9EFFC1885}" type="datetimeFigureOut">
               <a:rPr lang="es-AR" smtClean="0"/>
-              <a:t>3/9/2018</a:t>
+              <a:t>12/9/2018</a:t>
             </a:fld>
             <a:endParaRPr lang="es-AR"/>
           </a:p>
@@ -2935,7 +2946,7 @@
           <a:p>
             <a:fld id="{F42B13DB-78C3-41F4-B8AD-F2B9EFFC1885}" type="datetimeFigureOut">
               <a:rPr lang="es-AR" smtClean="0"/>
-              <a:t>3/9/2018</a:t>
+              <a:t>12/9/2018</a:t>
             </a:fld>
             <a:endParaRPr lang="es-AR"/>
           </a:p>
@@ -3580,6 +3591,2601 @@
 </p:sld>
 </file>
 
+<file path=ppt/slides/slide10.xml><?xml version="1.0" encoding="utf-8"?>
+<p:sld xmlns:a="http://schemas.openxmlformats.org/drawingml/2006/main" xmlns:r="http://schemas.openxmlformats.org/officeDocument/2006/relationships" xmlns:p="http://schemas.openxmlformats.org/presentationml/2006/main">
+  <p:cSld>
+    <p:spTree>
+      <p:nvGrpSpPr>
+        <p:cNvPr id="1" name=""/>
+        <p:cNvGrpSpPr/>
+        <p:nvPr/>
+      </p:nvGrpSpPr>
+      <p:grpSpPr>
+        <a:xfrm>
+          <a:off x="0" y="0"/>
+          <a:ext cx="0" cy="0"/>
+          <a:chOff x="0" y="0"/>
+          <a:chExt cx="0" cy="0"/>
+        </a:xfrm>
+      </p:grpSpPr>
+      <p:sp>
+        <p:nvSpPr>
+          <p:cNvPr id="2" name="CuadroTexto 1">
+            <a:extLst>
+              <a:ext uri="{FF2B5EF4-FFF2-40B4-BE49-F238E27FC236}">
+                <a16:creationId xmlns:a16="http://schemas.microsoft.com/office/drawing/2014/main" id="{E7821063-8664-46C6-9B3C-5B7064BB682D}"/>
+              </a:ext>
+            </a:extLst>
+          </p:cNvPr>
+          <p:cNvSpPr txBox="1"/>
+          <p:nvPr/>
+        </p:nvSpPr>
+        <p:spPr>
+          <a:xfrm>
+            <a:off x="159489" y="21265"/>
+            <a:ext cx="11706446" cy="6586418"/>
+          </a:xfrm>
+          <a:prstGeom prst="rect">
+            <a:avLst/>
+          </a:prstGeom>
+          <a:noFill/>
+        </p:spPr>
+        <p:txBody>
+          <a:bodyPr wrap="square" rtlCol="0">
+            <a:spAutoFit/>
+          </a:bodyPr>
+          <a:lstStyle/>
+          <a:p>
+            <a:pPr algn="ctr"/>
+            <a:r>
+              <a:rPr lang="es-AR" sz="4000" u="sng" dirty="0">
+                <a:solidFill>
+                  <a:schemeClr val="tx1">
+                    <a:lumMod val="65000"/>
+                    <a:lumOff val="35000"/>
+                  </a:schemeClr>
+                </a:solidFill>
+                <a:latin typeface="+mj-lt"/>
+                <a:ea typeface="+mj-ea"/>
+                <a:cs typeface="+mj-cs"/>
+              </a:rPr>
+              <a:t>Listas</a:t>
+            </a:r>
+          </a:p>
+          <a:p>
+            <a:endParaRPr lang="es-AR" dirty="0"/>
+          </a:p>
+          <a:p>
+            <a:r>
+              <a:rPr lang="es-AR" sz="2800" dirty="0">
+                <a:solidFill>
+                  <a:schemeClr val="tx1">
+                    <a:tint val="75000"/>
+                  </a:schemeClr>
+                </a:solidFill>
+              </a:rPr>
+              <a:t>Listas no ordenadas: En estas listas no importa el orden. Esta formada ítem de listas</a:t>
+            </a:r>
+          </a:p>
+          <a:p>
+            <a:pPr>
+              <a:lnSpc>
+                <a:spcPct val="70000"/>
+              </a:lnSpc>
+              <a:spcBef>
+                <a:spcPts val="1000"/>
+              </a:spcBef>
+            </a:pPr>
+            <a:r>
+              <a:rPr lang="es-AR" sz="2800" dirty="0">
+                <a:solidFill>
+                  <a:schemeClr val="tx1">
+                    <a:tint val="75000"/>
+                  </a:schemeClr>
+                </a:solidFill>
+              </a:rPr>
+              <a:t>Ejemplos.   </a:t>
+            </a:r>
+            <a:r>
+              <a:rPr lang="es-AR" sz="2800" dirty="0">
+                <a:solidFill>
+                  <a:schemeClr val="tx1">
+                    <a:lumMod val="75000"/>
+                    <a:lumOff val="25000"/>
+                  </a:schemeClr>
+                </a:solidFill>
+              </a:rPr>
+              <a:t>&lt;</a:t>
+            </a:r>
+            <a:r>
+              <a:rPr lang="es-AR" sz="2800" dirty="0" err="1">
+                <a:solidFill>
+                  <a:schemeClr val="tx1">
+                    <a:lumMod val="75000"/>
+                    <a:lumOff val="25000"/>
+                  </a:schemeClr>
+                </a:solidFill>
+              </a:rPr>
+              <a:t>ul</a:t>
+            </a:r>
+            <a:r>
+              <a:rPr lang="es-AR" sz="2800" dirty="0">
+                <a:solidFill>
+                  <a:schemeClr val="tx1">
+                    <a:lumMod val="75000"/>
+                    <a:lumOff val="25000"/>
+                  </a:schemeClr>
+                </a:solidFill>
+              </a:rPr>
+              <a:t>&gt;</a:t>
+            </a:r>
+          </a:p>
+          <a:p>
+            <a:pPr>
+              <a:lnSpc>
+                <a:spcPct val="70000"/>
+              </a:lnSpc>
+              <a:spcBef>
+                <a:spcPts val="1000"/>
+              </a:spcBef>
+            </a:pPr>
+            <a:r>
+              <a:rPr lang="es-AR" sz="2800" dirty="0">
+                <a:solidFill>
+                  <a:schemeClr val="tx1">
+                    <a:lumMod val="75000"/>
+                    <a:lumOff val="25000"/>
+                  </a:schemeClr>
+                </a:solidFill>
+              </a:rPr>
+              <a:t>                          &lt;li&gt;Argentina&lt;/li&gt;</a:t>
+            </a:r>
+          </a:p>
+          <a:p>
+            <a:pPr>
+              <a:lnSpc>
+                <a:spcPct val="70000"/>
+              </a:lnSpc>
+              <a:spcBef>
+                <a:spcPts val="1000"/>
+              </a:spcBef>
+            </a:pPr>
+            <a:r>
+              <a:rPr lang="es-AR" sz="2800" dirty="0">
+                <a:solidFill>
+                  <a:schemeClr val="tx1">
+                    <a:lumMod val="75000"/>
+                    <a:lumOff val="25000"/>
+                  </a:schemeClr>
+                </a:solidFill>
+              </a:rPr>
+              <a:t>                           &lt;li&gt;Perú&lt;/li&gt;</a:t>
+            </a:r>
+          </a:p>
+          <a:p>
+            <a:pPr>
+              <a:lnSpc>
+                <a:spcPct val="70000"/>
+              </a:lnSpc>
+              <a:spcBef>
+                <a:spcPts val="1000"/>
+              </a:spcBef>
+            </a:pPr>
+            <a:r>
+              <a:rPr lang="es-AR" sz="2800" dirty="0">
+                <a:solidFill>
+                  <a:schemeClr val="tx1">
+                    <a:lumMod val="75000"/>
+                    <a:lumOff val="25000"/>
+                  </a:schemeClr>
+                </a:solidFill>
+              </a:rPr>
+              <a:t>                           &lt;li&gt;Chile&lt;/li&gt;</a:t>
+            </a:r>
+          </a:p>
+          <a:p>
+            <a:pPr>
+              <a:lnSpc>
+                <a:spcPct val="70000"/>
+              </a:lnSpc>
+              <a:spcBef>
+                <a:spcPts val="1000"/>
+              </a:spcBef>
+            </a:pPr>
+            <a:r>
+              <a:rPr lang="es-AR" sz="2800" dirty="0">
+                <a:solidFill>
+                  <a:schemeClr val="tx1">
+                    <a:lumMod val="75000"/>
+                    <a:lumOff val="25000"/>
+                  </a:schemeClr>
+                </a:solidFill>
+              </a:rPr>
+              <a:t>                      &lt;/</a:t>
+            </a:r>
+            <a:r>
+              <a:rPr lang="es-AR" sz="2800" dirty="0" err="1">
+                <a:solidFill>
+                  <a:schemeClr val="tx1">
+                    <a:lumMod val="75000"/>
+                    <a:lumOff val="25000"/>
+                  </a:schemeClr>
+                </a:solidFill>
+              </a:rPr>
+              <a:t>ul</a:t>
+            </a:r>
+            <a:r>
+              <a:rPr lang="es-AR" sz="2800" dirty="0">
+                <a:solidFill>
+                  <a:schemeClr val="tx1">
+                    <a:lumMod val="75000"/>
+                    <a:lumOff val="25000"/>
+                  </a:schemeClr>
+                </a:solidFill>
+              </a:rPr>
+              <a:t>&gt;</a:t>
+            </a:r>
+          </a:p>
+          <a:p>
+            <a:r>
+              <a:rPr lang="es-AR" sz="2800" dirty="0">
+                <a:solidFill>
+                  <a:schemeClr val="tx1">
+                    <a:tint val="75000"/>
+                  </a:schemeClr>
+                </a:solidFill>
+              </a:rPr>
+              <a:t>Listas ordenadas: En estas listas importa el orden.</a:t>
+            </a:r>
+          </a:p>
+          <a:p>
+            <a:pPr>
+              <a:lnSpc>
+                <a:spcPct val="70000"/>
+              </a:lnSpc>
+              <a:spcBef>
+                <a:spcPts val="1000"/>
+              </a:spcBef>
+            </a:pPr>
+            <a:r>
+              <a:rPr lang="es-AR" sz="2800" dirty="0">
+                <a:solidFill>
+                  <a:schemeClr val="tx1">
+                    <a:tint val="75000"/>
+                  </a:schemeClr>
+                </a:solidFill>
+              </a:rPr>
+              <a:t>Ejemplo. </a:t>
+            </a:r>
+            <a:r>
+              <a:rPr lang="es-AR" sz="2800" dirty="0">
+                <a:solidFill>
+                  <a:schemeClr val="tx1">
+                    <a:lumMod val="75000"/>
+                    <a:lumOff val="25000"/>
+                  </a:schemeClr>
+                </a:solidFill>
+              </a:rPr>
+              <a:t>&lt;</a:t>
+            </a:r>
+            <a:r>
+              <a:rPr lang="es-AR" sz="2800" dirty="0" err="1">
+                <a:solidFill>
+                  <a:schemeClr val="tx1">
+                    <a:lumMod val="75000"/>
+                    <a:lumOff val="25000"/>
+                  </a:schemeClr>
+                </a:solidFill>
+              </a:rPr>
+              <a:t>ol</a:t>
+            </a:r>
+            <a:r>
+              <a:rPr lang="es-AR" sz="2800" dirty="0">
+                <a:solidFill>
+                  <a:schemeClr val="tx1">
+                    <a:lumMod val="75000"/>
+                    <a:lumOff val="25000"/>
+                  </a:schemeClr>
+                </a:solidFill>
+              </a:rPr>
+              <a:t>&gt;</a:t>
+            </a:r>
+          </a:p>
+          <a:p>
+            <a:pPr>
+              <a:lnSpc>
+                <a:spcPct val="70000"/>
+              </a:lnSpc>
+              <a:spcBef>
+                <a:spcPts val="1000"/>
+              </a:spcBef>
+            </a:pPr>
+            <a:r>
+              <a:rPr lang="es-AR" sz="2800" dirty="0">
+                <a:solidFill>
+                  <a:schemeClr val="tx1">
+                    <a:lumMod val="75000"/>
+                    <a:lumOff val="25000"/>
+                  </a:schemeClr>
+                </a:solidFill>
+              </a:rPr>
+              <a:t>    		&lt;li&gt;Primer elemento&lt;/li&gt;</a:t>
+            </a:r>
+          </a:p>
+          <a:p>
+            <a:pPr>
+              <a:lnSpc>
+                <a:spcPct val="70000"/>
+              </a:lnSpc>
+              <a:spcBef>
+                <a:spcPts val="1000"/>
+              </a:spcBef>
+            </a:pPr>
+            <a:r>
+              <a:rPr lang="es-AR" sz="2800" dirty="0">
+                <a:solidFill>
+                  <a:schemeClr val="tx1">
+                    <a:lumMod val="75000"/>
+                    <a:lumOff val="25000"/>
+                  </a:schemeClr>
+                </a:solidFill>
+              </a:rPr>
+              <a:t>   		&lt;li&gt;Segundo elemento&lt;/li&gt;</a:t>
+            </a:r>
+          </a:p>
+          <a:p>
+            <a:pPr>
+              <a:lnSpc>
+                <a:spcPct val="70000"/>
+              </a:lnSpc>
+              <a:spcBef>
+                <a:spcPts val="1000"/>
+              </a:spcBef>
+            </a:pPr>
+            <a:r>
+              <a:rPr lang="es-AR" sz="2800" dirty="0">
+                <a:solidFill>
+                  <a:schemeClr val="tx1">
+                    <a:lumMod val="75000"/>
+                    <a:lumOff val="25000"/>
+                  </a:schemeClr>
+                </a:solidFill>
+              </a:rPr>
+              <a:t>   		&lt;li&gt;Tercer elemento&lt;/li&gt;</a:t>
+            </a:r>
+          </a:p>
+          <a:p>
+            <a:pPr>
+              <a:lnSpc>
+                <a:spcPct val="70000"/>
+              </a:lnSpc>
+              <a:spcBef>
+                <a:spcPts val="1000"/>
+              </a:spcBef>
+            </a:pPr>
+            <a:r>
+              <a:rPr lang="es-AR" sz="2800" dirty="0">
+                <a:solidFill>
+                  <a:schemeClr val="tx1">
+                    <a:lumMod val="75000"/>
+                    <a:lumOff val="25000"/>
+                  </a:schemeClr>
+                </a:solidFill>
+              </a:rPr>
+              <a:t>                 &lt;/</a:t>
+            </a:r>
+            <a:r>
+              <a:rPr lang="es-AR" sz="2800" dirty="0" err="1">
+                <a:solidFill>
+                  <a:schemeClr val="tx1">
+                    <a:lumMod val="75000"/>
+                    <a:lumOff val="25000"/>
+                  </a:schemeClr>
+                </a:solidFill>
+              </a:rPr>
+              <a:t>ol</a:t>
+            </a:r>
+            <a:r>
+              <a:rPr lang="es-AR" sz="2800" dirty="0">
+                <a:solidFill>
+                  <a:schemeClr val="tx1">
+                    <a:lumMod val="75000"/>
+                    <a:lumOff val="25000"/>
+                  </a:schemeClr>
+                </a:solidFill>
+              </a:rPr>
+              <a:t>&gt;</a:t>
+            </a:r>
+          </a:p>
+        </p:txBody>
+      </p:sp>
+      <p:pic>
+        <p:nvPicPr>
+          <p:cNvPr id="3" name="Imagen 2">
+            <a:extLst>
+              <a:ext uri="{FF2B5EF4-FFF2-40B4-BE49-F238E27FC236}">
+                <a16:creationId xmlns:a16="http://schemas.microsoft.com/office/drawing/2014/main" id="{52244BC4-7791-4C5D-B193-3D45D303DFBF}"/>
+              </a:ext>
+            </a:extLst>
+          </p:cNvPr>
+          <p:cNvPicPr>
+            <a:picLocks noChangeAspect="1"/>
+          </p:cNvPicPr>
+          <p:nvPr/>
+        </p:nvPicPr>
+        <p:blipFill>
+          <a:blip r:embed="rId2"/>
+          <a:stretch>
+            <a:fillRect/>
+          </a:stretch>
+        </p:blipFill>
+        <p:spPr>
+          <a:xfrm>
+            <a:off x="6720330" y="2484253"/>
+            <a:ext cx="1661670" cy="944747"/>
+          </a:xfrm>
+          <a:prstGeom prst="rect">
+            <a:avLst/>
+          </a:prstGeom>
+        </p:spPr>
+      </p:pic>
+      <p:pic>
+        <p:nvPicPr>
+          <p:cNvPr id="5" name="Imagen 4">
+            <a:extLst>
+              <a:ext uri="{FF2B5EF4-FFF2-40B4-BE49-F238E27FC236}">
+                <a16:creationId xmlns:a16="http://schemas.microsoft.com/office/drawing/2014/main" id="{AABD0B02-C293-4825-8A58-3BF4015419BE}"/>
+              </a:ext>
+            </a:extLst>
+          </p:cNvPr>
+          <p:cNvPicPr>
+            <a:picLocks noChangeAspect="1"/>
+          </p:cNvPicPr>
+          <p:nvPr/>
+        </p:nvPicPr>
+        <p:blipFill>
+          <a:blip r:embed="rId3"/>
+          <a:stretch>
+            <a:fillRect/>
+          </a:stretch>
+        </p:blipFill>
+        <p:spPr>
+          <a:xfrm>
+            <a:off x="6858001" y="4718640"/>
+            <a:ext cx="1968500" cy="1491659"/>
+          </a:xfrm>
+          <a:prstGeom prst="rect">
+            <a:avLst/>
+          </a:prstGeom>
+        </p:spPr>
+      </p:pic>
+    </p:spTree>
+    <p:extLst>
+      <p:ext uri="{BB962C8B-B14F-4D97-AF65-F5344CB8AC3E}">
+        <p14:creationId xmlns:p14="http://schemas.microsoft.com/office/powerpoint/2010/main" val="2248106675"/>
+      </p:ext>
+    </p:extLst>
+  </p:cSld>
+  <p:clrMapOvr>
+    <a:masterClrMapping/>
+  </p:clrMapOvr>
+</p:sld>
+</file>
+
+<file path=ppt/slides/slide11.xml><?xml version="1.0" encoding="utf-8"?>
+<p:sld xmlns:a="http://schemas.openxmlformats.org/drawingml/2006/main" xmlns:r="http://schemas.openxmlformats.org/officeDocument/2006/relationships" xmlns:p="http://schemas.openxmlformats.org/presentationml/2006/main">
+  <p:cSld>
+    <p:spTree>
+      <p:nvGrpSpPr>
+        <p:cNvPr id="1" name=""/>
+        <p:cNvGrpSpPr/>
+        <p:nvPr/>
+      </p:nvGrpSpPr>
+      <p:grpSpPr>
+        <a:xfrm>
+          <a:off x="0" y="0"/>
+          <a:ext cx="0" cy="0"/>
+          <a:chOff x="0" y="0"/>
+          <a:chExt cx="0" cy="0"/>
+        </a:xfrm>
+      </p:grpSpPr>
+      <p:sp>
+        <p:nvSpPr>
+          <p:cNvPr id="4" name="CuadroTexto 3">
+            <a:extLst>
+              <a:ext uri="{FF2B5EF4-FFF2-40B4-BE49-F238E27FC236}">
+                <a16:creationId xmlns:a16="http://schemas.microsoft.com/office/drawing/2014/main" id="{602FB3E5-D534-4140-A37F-0C7AEE3FD8D2}"/>
+              </a:ext>
+            </a:extLst>
+          </p:cNvPr>
+          <p:cNvSpPr txBox="1"/>
+          <p:nvPr/>
+        </p:nvSpPr>
+        <p:spPr>
+          <a:xfrm>
+            <a:off x="0" y="292100"/>
+            <a:ext cx="12192000" cy="1815882"/>
+          </a:xfrm>
+          <a:prstGeom prst="rect">
+            <a:avLst/>
+          </a:prstGeom>
+          <a:noFill/>
+        </p:spPr>
+        <p:txBody>
+          <a:bodyPr wrap="square" rtlCol="0">
+            <a:spAutoFit/>
+          </a:bodyPr>
+          <a:lstStyle/>
+          <a:p>
+            <a:pPr algn="ctr"/>
+            <a:r>
+              <a:rPr lang="es-AR" sz="4000" u="sng" dirty="0">
+                <a:solidFill>
+                  <a:schemeClr val="tx1">
+                    <a:lumMod val="65000"/>
+                    <a:lumOff val="35000"/>
+                  </a:schemeClr>
+                </a:solidFill>
+                <a:latin typeface="+mj-lt"/>
+                <a:ea typeface="+mj-ea"/>
+                <a:cs typeface="+mj-cs"/>
+              </a:rPr>
+              <a:t>Lista de definición.</a:t>
+            </a:r>
+          </a:p>
+          <a:p>
+            <a:endParaRPr lang="es-AR" dirty="0"/>
+          </a:p>
+          <a:p>
+            <a:r>
+              <a:rPr lang="es-AR" sz="2700" dirty="0">
+                <a:solidFill>
+                  <a:schemeClr val="tx1">
+                    <a:tint val="75000"/>
+                  </a:schemeClr>
+                </a:solidFill>
+              </a:rPr>
+              <a:t>Esta compuesta por dl: lista de definición, dt: termino de definición, dd: descripción de definición.</a:t>
+            </a:r>
+          </a:p>
+        </p:txBody>
+      </p:sp>
+      <p:sp>
+        <p:nvSpPr>
+          <p:cNvPr id="5" name="Rectángulo 4">
+            <a:extLst>
+              <a:ext uri="{FF2B5EF4-FFF2-40B4-BE49-F238E27FC236}">
+                <a16:creationId xmlns:a16="http://schemas.microsoft.com/office/drawing/2014/main" id="{31E9140C-F578-4F9F-AE7B-49FA3EE46D4E}"/>
+              </a:ext>
+            </a:extLst>
+          </p:cNvPr>
+          <p:cNvSpPr/>
+          <p:nvPr/>
+        </p:nvSpPr>
+        <p:spPr>
+          <a:xfrm>
+            <a:off x="215900" y="2196664"/>
+            <a:ext cx="7150100" cy="4524315"/>
+          </a:xfrm>
+          <a:prstGeom prst="rect">
+            <a:avLst/>
+          </a:prstGeom>
+        </p:spPr>
+        <p:txBody>
+          <a:bodyPr wrap="square">
+            <a:spAutoFit/>
+          </a:bodyPr>
+          <a:lstStyle/>
+          <a:p>
+            <a:r>
+              <a:rPr lang="es-AR" dirty="0"/>
+              <a:t>&lt;dl&gt;</a:t>
+            </a:r>
+          </a:p>
+          <a:p>
+            <a:r>
+              <a:rPr lang="es-AR" dirty="0"/>
+              <a:t>  &lt;dt&gt;SGML&lt;/dt&gt;</a:t>
+            </a:r>
+          </a:p>
+          <a:p>
+            <a:r>
+              <a:rPr lang="es-AR" dirty="0"/>
+              <a:t>  &lt;dd&gt;Metalenguaje para la definición de otros lenguajes de marcado&lt;/dd&gt;  </a:t>
+            </a:r>
+          </a:p>
+          <a:p>
+            <a:r>
+              <a:rPr lang="es-AR" dirty="0"/>
+              <a:t>  </a:t>
+            </a:r>
+          </a:p>
+          <a:p>
+            <a:r>
+              <a:rPr lang="es-AR" dirty="0"/>
+              <a:t>  &lt;dt&gt;XML&lt;/dt&gt;</a:t>
+            </a:r>
+          </a:p>
+          <a:p>
+            <a:r>
+              <a:rPr lang="es-AR" dirty="0"/>
+              <a:t>  &lt;dd&gt;Lenguaje basado en SGML y que se emplea para describir datos&lt;/dd&gt;</a:t>
+            </a:r>
+          </a:p>
+          <a:p>
+            <a:endParaRPr lang="es-AR" dirty="0"/>
+          </a:p>
+          <a:p>
+            <a:r>
+              <a:rPr lang="es-AR" dirty="0"/>
+              <a:t>  &lt;dt&gt;RSS&lt;/dt&gt;</a:t>
+            </a:r>
+          </a:p>
+          <a:p>
+            <a:r>
+              <a:rPr lang="es-AR" dirty="0"/>
+              <a:t>  &lt;dt&gt;GML&lt;/dt&gt;</a:t>
+            </a:r>
+          </a:p>
+          <a:p>
+            <a:r>
+              <a:rPr lang="es-AR" dirty="0"/>
+              <a:t>  &lt;dt&gt;XHTML&lt;/dt&gt;</a:t>
+            </a:r>
+          </a:p>
+          <a:p>
+            <a:r>
+              <a:rPr lang="es-AR" dirty="0"/>
+              <a:t>  &lt;dt&gt;SVG&lt;/dt&gt;</a:t>
+            </a:r>
+          </a:p>
+          <a:p>
+            <a:r>
+              <a:rPr lang="es-AR" dirty="0"/>
+              <a:t>  &lt;dt&gt;XUL&lt;/dt&gt;</a:t>
+            </a:r>
+          </a:p>
+          <a:p>
+            <a:r>
+              <a:rPr lang="es-AR" dirty="0"/>
+              <a:t>  &lt;dd&gt;Lenguajes derivados de XML para determinadas aplicaciones&lt;/dd&gt;</a:t>
+            </a:r>
+          </a:p>
+          <a:p>
+            <a:r>
+              <a:rPr lang="es-AR" dirty="0"/>
+              <a:t>&lt;/dl&gt;</a:t>
+            </a:r>
+          </a:p>
+        </p:txBody>
+      </p:sp>
+      <p:pic>
+        <p:nvPicPr>
+          <p:cNvPr id="6" name="Imagen 5">
+            <a:extLst>
+              <a:ext uri="{FF2B5EF4-FFF2-40B4-BE49-F238E27FC236}">
+                <a16:creationId xmlns:a16="http://schemas.microsoft.com/office/drawing/2014/main" id="{6BE78F7D-3F1E-420C-A209-E3DD1FCF1A32}"/>
+              </a:ext>
+            </a:extLst>
+          </p:cNvPr>
+          <p:cNvPicPr>
+            <a:picLocks noChangeAspect="1"/>
+          </p:cNvPicPr>
+          <p:nvPr/>
+        </p:nvPicPr>
+        <p:blipFill>
+          <a:blip r:embed="rId2"/>
+          <a:stretch>
+            <a:fillRect/>
+          </a:stretch>
+        </p:blipFill>
+        <p:spPr>
+          <a:xfrm>
+            <a:off x="6540500" y="2667000"/>
+            <a:ext cx="5321300" cy="2921000"/>
+          </a:xfrm>
+          <a:prstGeom prst="rect">
+            <a:avLst/>
+          </a:prstGeom>
+        </p:spPr>
+      </p:pic>
+    </p:spTree>
+    <p:extLst>
+      <p:ext uri="{BB962C8B-B14F-4D97-AF65-F5344CB8AC3E}">
+        <p14:creationId xmlns:p14="http://schemas.microsoft.com/office/powerpoint/2010/main" val="1389903414"/>
+      </p:ext>
+    </p:extLst>
+  </p:cSld>
+  <p:clrMapOvr>
+    <a:masterClrMapping/>
+  </p:clrMapOvr>
+</p:sld>
+</file>
+
+<file path=ppt/slides/slide12.xml><?xml version="1.0" encoding="utf-8"?>
+<p:sld xmlns:a="http://schemas.openxmlformats.org/drawingml/2006/main" xmlns:r="http://schemas.openxmlformats.org/officeDocument/2006/relationships" xmlns:p="http://schemas.openxmlformats.org/presentationml/2006/main">
+  <p:cSld>
+    <p:spTree>
+      <p:nvGrpSpPr>
+        <p:cNvPr id="1" name=""/>
+        <p:cNvGrpSpPr/>
+        <p:nvPr/>
+      </p:nvGrpSpPr>
+      <p:grpSpPr>
+        <a:xfrm>
+          <a:off x="0" y="0"/>
+          <a:ext cx="0" cy="0"/>
+          <a:chOff x="0" y="0"/>
+          <a:chExt cx="0" cy="0"/>
+        </a:xfrm>
+      </p:grpSpPr>
+      <p:sp>
+        <p:nvSpPr>
+          <p:cNvPr id="2" name="CuadroTexto 1">
+            <a:extLst>
+              <a:ext uri="{FF2B5EF4-FFF2-40B4-BE49-F238E27FC236}">
+                <a16:creationId xmlns:a16="http://schemas.microsoft.com/office/drawing/2014/main" id="{48ECA980-4011-450C-8D8A-954C047FFBC0}"/>
+              </a:ext>
+            </a:extLst>
+          </p:cNvPr>
+          <p:cNvSpPr txBox="1"/>
+          <p:nvPr/>
+        </p:nvSpPr>
+        <p:spPr>
+          <a:xfrm>
+            <a:off x="127589" y="151179"/>
+            <a:ext cx="12053777" cy="6555641"/>
+          </a:xfrm>
+          <a:prstGeom prst="rect">
+            <a:avLst/>
+          </a:prstGeom>
+          <a:noFill/>
+        </p:spPr>
+        <p:txBody>
+          <a:bodyPr wrap="square" rtlCol="0">
+            <a:spAutoFit/>
+          </a:bodyPr>
+          <a:lstStyle/>
+          <a:p>
+            <a:pPr algn="ctr"/>
+            <a:r>
+              <a:rPr lang="es-AR" sz="4000" u="sng" dirty="0">
+                <a:solidFill>
+                  <a:schemeClr val="tx1">
+                    <a:lumMod val="65000"/>
+                    <a:lumOff val="35000"/>
+                  </a:schemeClr>
+                </a:solidFill>
+                <a:latin typeface="+mj-lt"/>
+                <a:ea typeface="+mj-ea"/>
+                <a:cs typeface="+mj-cs"/>
+              </a:rPr>
+              <a:t>Imágenes</a:t>
+            </a:r>
+          </a:p>
+          <a:p>
+            <a:endParaRPr lang="es-AR" dirty="0"/>
+          </a:p>
+          <a:p>
+            <a:r>
+              <a:rPr lang="es-AR" sz="2800" dirty="0">
+                <a:solidFill>
+                  <a:schemeClr val="tx1">
+                    <a:tint val="75000"/>
+                  </a:schemeClr>
+                </a:solidFill>
+              </a:rPr>
+              <a:t>Para insertar una imagen se utiliza la etiqueta &lt;</a:t>
+            </a:r>
+            <a:r>
+              <a:rPr lang="es-AR" sz="2800" dirty="0" err="1">
+                <a:solidFill>
+                  <a:schemeClr val="tx1">
+                    <a:tint val="75000"/>
+                  </a:schemeClr>
+                </a:solidFill>
+              </a:rPr>
+              <a:t>img</a:t>
+            </a:r>
+            <a:r>
+              <a:rPr lang="es-AR" sz="2800" dirty="0">
+                <a:solidFill>
+                  <a:schemeClr val="tx1">
+                    <a:tint val="75000"/>
+                  </a:schemeClr>
+                </a:solidFill>
+              </a:rPr>
+              <a:t>&gt;. Es una etiqueta </a:t>
+            </a:r>
+            <a:r>
+              <a:rPr lang="es-AR" sz="2800" dirty="0" err="1">
+                <a:solidFill>
+                  <a:schemeClr val="tx1">
+                    <a:tint val="75000"/>
+                  </a:schemeClr>
+                </a:solidFill>
+              </a:rPr>
+              <a:t>inline</a:t>
+            </a:r>
+            <a:r>
+              <a:rPr lang="es-AR" sz="2800" dirty="0">
+                <a:solidFill>
+                  <a:schemeClr val="tx1">
+                    <a:tint val="75000"/>
+                  </a:schemeClr>
+                </a:solidFill>
+              </a:rPr>
+              <a:t>, que no tiene etiqueta de cierre.</a:t>
+            </a:r>
+          </a:p>
+          <a:p>
+            <a:r>
+              <a:rPr lang="es-AR" sz="2800" dirty="0">
+                <a:solidFill>
+                  <a:schemeClr val="tx1">
+                    <a:tint val="75000"/>
+                  </a:schemeClr>
+                </a:solidFill>
+              </a:rPr>
+              <a:t>Los atributos que tiene son:</a:t>
+            </a:r>
+          </a:p>
+          <a:p>
+            <a:pPr lvl="2"/>
+            <a:r>
+              <a:rPr lang="es-AR" sz="2800" dirty="0" err="1">
+                <a:solidFill>
+                  <a:schemeClr val="tx1">
+                    <a:lumMod val="75000"/>
+                    <a:lumOff val="25000"/>
+                  </a:schemeClr>
+                </a:solidFill>
+              </a:rPr>
+              <a:t>src</a:t>
+            </a:r>
+            <a:r>
+              <a:rPr lang="es-AR" sz="2800" dirty="0">
+                <a:solidFill>
+                  <a:schemeClr val="tx1">
+                    <a:tint val="75000"/>
+                  </a:schemeClr>
+                </a:solidFill>
+              </a:rPr>
+              <a:t>: es la </a:t>
+            </a:r>
+            <a:r>
+              <a:rPr lang="es-AR" sz="2800" dirty="0" err="1">
+                <a:solidFill>
+                  <a:schemeClr val="tx1">
+                    <a:tint val="75000"/>
+                  </a:schemeClr>
+                </a:solidFill>
+              </a:rPr>
+              <a:t>url</a:t>
+            </a:r>
+            <a:r>
+              <a:rPr lang="es-AR" sz="2800" dirty="0">
+                <a:solidFill>
+                  <a:schemeClr val="tx1">
+                    <a:tint val="75000"/>
+                  </a:schemeClr>
+                </a:solidFill>
+              </a:rPr>
+              <a:t> de la imagen que se muestra.</a:t>
+            </a:r>
+          </a:p>
+          <a:p>
+            <a:pPr lvl="2"/>
+            <a:r>
+              <a:rPr lang="es-AR" sz="2800" dirty="0" err="1">
+                <a:solidFill>
+                  <a:schemeClr val="tx1">
+                    <a:lumMod val="75000"/>
+                    <a:lumOff val="25000"/>
+                  </a:schemeClr>
+                </a:solidFill>
+              </a:rPr>
+              <a:t>alt</a:t>
+            </a:r>
+            <a:r>
+              <a:rPr lang="es-AR" sz="2800" dirty="0">
+                <a:solidFill>
+                  <a:schemeClr val="tx1">
+                    <a:tint val="75000"/>
+                  </a:schemeClr>
+                </a:solidFill>
+              </a:rPr>
+              <a:t>: texto que se muestra cuando no se encuentra la imagen.</a:t>
+            </a:r>
+          </a:p>
+          <a:p>
+            <a:pPr lvl="2"/>
+            <a:r>
+              <a:rPr lang="es-AR" sz="2800" dirty="0" err="1">
+                <a:solidFill>
+                  <a:schemeClr val="tx1">
+                    <a:lumMod val="75000"/>
+                    <a:lumOff val="25000"/>
+                  </a:schemeClr>
+                </a:solidFill>
+              </a:rPr>
+              <a:t>width</a:t>
+            </a:r>
+            <a:r>
+              <a:rPr lang="es-AR" sz="2800" dirty="0">
+                <a:solidFill>
+                  <a:schemeClr val="tx1">
+                    <a:tint val="75000"/>
+                  </a:schemeClr>
+                </a:solidFill>
+              </a:rPr>
+              <a:t> y </a:t>
+            </a:r>
+            <a:r>
+              <a:rPr lang="es-AR" sz="2800" dirty="0" err="1">
+                <a:solidFill>
+                  <a:schemeClr val="tx1">
+                    <a:lumMod val="75000"/>
+                    <a:lumOff val="25000"/>
+                  </a:schemeClr>
+                </a:solidFill>
+              </a:rPr>
+              <a:t>height</a:t>
+            </a:r>
+            <a:r>
+              <a:rPr lang="es-AR" sz="2800" dirty="0">
+                <a:solidFill>
+                  <a:schemeClr val="tx1">
+                    <a:tint val="75000"/>
+                  </a:schemeClr>
+                </a:solidFill>
+              </a:rPr>
+              <a:t> ancho y alto de la imagen.</a:t>
+            </a:r>
+          </a:p>
+          <a:p>
+            <a:pPr>
+              <a:lnSpc>
+                <a:spcPct val="70000"/>
+              </a:lnSpc>
+              <a:spcBef>
+                <a:spcPts val="1000"/>
+              </a:spcBef>
+            </a:pPr>
+            <a:r>
+              <a:rPr lang="es-AR" sz="2800" dirty="0">
+                <a:solidFill>
+                  <a:schemeClr val="tx1">
+                    <a:lumMod val="75000"/>
+                    <a:lumOff val="25000"/>
+                  </a:schemeClr>
+                </a:solidFill>
+              </a:rPr>
+              <a:t>&lt;p&gt;</a:t>
+            </a:r>
+          </a:p>
+          <a:p>
+            <a:r>
+              <a:rPr lang="es-AR" sz="2800" dirty="0">
+                <a:solidFill>
+                  <a:schemeClr val="tx1">
+                    <a:tint val="75000"/>
+                  </a:schemeClr>
+                </a:solidFill>
+              </a:rPr>
+              <a:t>      </a:t>
+            </a:r>
+            <a:r>
+              <a:rPr lang="es-AR" sz="2800" dirty="0" err="1">
+                <a:solidFill>
+                  <a:schemeClr val="tx1">
+                    <a:tint val="75000"/>
+                  </a:schemeClr>
+                </a:solidFill>
+              </a:rPr>
+              <a:t>Lorem</a:t>
+            </a:r>
+            <a:r>
+              <a:rPr lang="es-AR" sz="2800" dirty="0">
+                <a:solidFill>
+                  <a:schemeClr val="tx1">
+                    <a:tint val="75000"/>
+                  </a:schemeClr>
+                </a:solidFill>
+              </a:rPr>
+              <a:t> </a:t>
+            </a:r>
+            <a:r>
+              <a:rPr lang="es-AR" sz="2800" dirty="0" err="1">
+                <a:solidFill>
+                  <a:schemeClr val="tx1">
+                    <a:tint val="75000"/>
+                  </a:schemeClr>
+                </a:solidFill>
+              </a:rPr>
+              <a:t>ipsum</a:t>
+            </a:r>
+            <a:r>
+              <a:rPr lang="es-AR" sz="2800" dirty="0">
+                <a:solidFill>
+                  <a:schemeClr val="tx1">
+                    <a:tint val="75000"/>
+                  </a:schemeClr>
+                </a:solidFill>
+              </a:rPr>
+              <a:t> dolor </a:t>
+            </a:r>
+            <a:r>
+              <a:rPr lang="es-AR" sz="2800" dirty="0" err="1">
+                <a:solidFill>
+                  <a:schemeClr val="tx1">
+                    <a:tint val="75000"/>
+                  </a:schemeClr>
+                </a:solidFill>
+              </a:rPr>
+              <a:t>sit</a:t>
+            </a:r>
+            <a:r>
+              <a:rPr lang="es-AR" sz="2800" dirty="0">
+                <a:solidFill>
+                  <a:schemeClr val="tx1">
+                    <a:tint val="75000"/>
+                  </a:schemeClr>
+                </a:solidFill>
+              </a:rPr>
+              <a:t> </a:t>
+            </a:r>
+            <a:r>
+              <a:rPr lang="es-AR" sz="2800" dirty="0" err="1">
+                <a:solidFill>
+                  <a:schemeClr val="tx1">
+                    <a:tint val="75000"/>
+                  </a:schemeClr>
+                </a:solidFill>
+              </a:rPr>
+              <a:t>amet</a:t>
+            </a:r>
+            <a:r>
+              <a:rPr lang="es-AR" sz="2800" dirty="0">
+                <a:solidFill>
+                  <a:schemeClr val="tx1">
+                    <a:tint val="75000"/>
+                  </a:schemeClr>
+                </a:solidFill>
+              </a:rPr>
+              <a:t>,</a:t>
+            </a:r>
+          </a:p>
+          <a:p>
+            <a:r>
+              <a:rPr lang="es-AR" sz="2800" dirty="0">
+                <a:solidFill>
+                  <a:schemeClr val="tx1">
+                    <a:tint val="75000"/>
+                  </a:schemeClr>
+                </a:solidFill>
+              </a:rPr>
+              <a:t>        </a:t>
+            </a:r>
+            <a:r>
+              <a:rPr lang="es-AR" sz="2800" dirty="0">
+                <a:solidFill>
+                  <a:schemeClr val="tx1">
+                    <a:lumMod val="75000"/>
+                    <a:lumOff val="25000"/>
+                  </a:schemeClr>
+                </a:solidFill>
+              </a:rPr>
+              <a:t>&lt;</a:t>
+            </a:r>
+            <a:r>
+              <a:rPr lang="es-AR" sz="2800" dirty="0" err="1">
+                <a:solidFill>
+                  <a:schemeClr val="tx1">
+                    <a:lumMod val="75000"/>
+                    <a:lumOff val="25000"/>
+                  </a:schemeClr>
+                </a:solidFill>
+              </a:rPr>
+              <a:t>img</a:t>
+            </a:r>
+            <a:r>
+              <a:rPr lang="es-AR" sz="2800" dirty="0">
+                <a:solidFill>
+                  <a:schemeClr val="tx1">
+                    <a:lumMod val="75000"/>
+                    <a:lumOff val="25000"/>
+                  </a:schemeClr>
+                </a:solidFill>
+              </a:rPr>
+              <a:t> </a:t>
+            </a:r>
+            <a:r>
+              <a:rPr lang="es-AR" sz="2800" dirty="0" err="1">
+                <a:solidFill>
+                  <a:schemeClr val="tx1">
+                    <a:lumMod val="75000"/>
+                    <a:lumOff val="25000"/>
+                  </a:schemeClr>
+                </a:solidFill>
+              </a:rPr>
+              <a:t>src</a:t>
+            </a:r>
+            <a:r>
+              <a:rPr lang="es-AR" sz="2800" dirty="0">
+                <a:solidFill>
+                  <a:schemeClr val="tx1">
+                    <a:lumMod val="75000"/>
+                    <a:lumOff val="25000"/>
+                  </a:schemeClr>
+                </a:solidFill>
+              </a:rPr>
+              <a:t>="</a:t>
+            </a:r>
+            <a:r>
+              <a:rPr lang="es-AR" sz="2800" dirty="0" err="1">
+                <a:solidFill>
+                  <a:schemeClr val="tx1">
+                    <a:lumMod val="75000"/>
+                    <a:lumOff val="25000"/>
+                  </a:schemeClr>
+                </a:solidFill>
+              </a:rPr>
+              <a:t>img</a:t>
+            </a:r>
+            <a:r>
+              <a:rPr lang="es-AR" sz="2800" dirty="0">
+                <a:solidFill>
+                  <a:schemeClr val="tx1">
+                    <a:lumMod val="75000"/>
+                    <a:lumOff val="25000"/>
+                  </a:schemeClr>
+                </a:solidFill>
+              </a:rPr>
+              <a:t>/schnauzer.jpg" </a:t>
+            </a:r>
+            <a:r>
+              <a:rPr lang="es-AR" sz="2800" dirty="0" err="1">
+                <a:solidFill>
+                  <a:schemeClr val="tx1">
+                    <a:lumMod val="75000"/>
+                    <a:lumOff val="25000"/>
+                  </a:schemeClr>
+                </a:solidFill>
+              </a:rPr>
+              <a:t>alt</a:t>
+            </a:r>
+            <a:r>
+              <a:rPr lang="es-AR" sz="2800" dirty="0">
+                <a:solidFill>
+                  <a:schemeClr val="tx1">
+                    <a:lumMod val="75000"/>
+                    <a:lumOff val="25000"/>
+                  </a:schemeClr>
+                </a:solidFill>
+              </a:rPr>
+              <a:t>="Perrito </a:t>
+            </a:r>
+            <a:r>
+              <a:rPr lang="es-AR" sz="2800" dirty="0" err="1">
+                <a:solidFill>
+                  <a:schemeClr val="tx1">
+                    <a:lumMod val="75000"/>
+                    <a:lumOff val="25000"/>
+                  </a:schemeClr>
+                </a:solidFill>
+              </a:rPr>
+              <a:t>schnauzer</a:t>
+            </a:r>
+            <a:r>
+              <a:rPr lang="es-AR" sz="2800" dirty="0">
+                <a:solidFill>
+                  <a:schemeClr val="tx1">
+                    <a:lumMod val="75000"/>
+                    <a:lumOff val="25000"/>
+                  </a:schemeClr>
+                </a:solidFill>
+              </a:rPr>
+              <a:t>"&gt;</a:t>
+            </a:r>
+          </a:p>
+          <a:p>
+            <a:r>
+              <a:rPr lang="es-AR" sz="2800" dirty="0">
+                <a:solidFill>
+                  <a:schemeClr val="tx1">
+                    <a:tint val="75000"/>
+                  </a:schemeClr>
+                </a:solidFill>
+              </a:rPr>
+              <a:t>       </a:t>
+            </a:r>
+            <a:r>
+              <a:rPr lang="es-AR" sz="2800" dirty="0" err="1">
+                <a:solidFill>
+                  <a:schemeClr val="tx1">
+                    <a:tint val="75000"/>
+                  </a:schemeClr>
+                </a:solidFill>
+              </a:rPr>
+              <a:t>consectetur</a:t>
+            </a:r>
+            <a:r>
+              <a:rPr lang="es-AR" sz="2800" dirty="0">
+                <a:solidFill>
+                  <a:schemeClr val="tx1">
+                    <a:tint val="75000"/>
+                  </a:schemeClr>
+                </a:solidFill>
+              </a:rPr>
+              <a:t> </a:t>
+            </a:r>
+            <a:r>
+              <a:rPr lang="es-AR" sz="2800" dirty="0" err="1">
+                <a:solidFill>
+                  <a:schemeClr val="tx1">
+                    <a:tint val="75000"/>
+                  </a:schemeClr>
+                </a:solidFill>
+              </a:rPr>
+              <a:t>adipisicing</a:t>
+            </a:r>
+            <a:r>
+              <a:rPr lang="es-AR" sz="2800" dirty="0">
+                <a:solidFill>
+                  <a:schemeClr val="tx1">
+                    <a:tint val="75000"/>
+                  </a:schemeClr>
+                </a:solidFill>
+              </a:rPr>
+              <a:t> </a:t>
+            </a:r>
+            <a:r>
+              <a:rPr lang="es-AR" sz="2800" dirty="0" err="1">
+                <a:solidFill>
+                  <a:schemeClr val="tx1">
+                    <a:tint val="75000"/>
+                  </a:schemeClr>
+                </a:solidFill>
+              </a:rPr>
+              <a:t>elit</a:t>
+            </a:r>
+            <a:endParaRPr lang="es-AR" sz="2800" dirty="0">
+              <a:solidFill>
+                <a:schemeClr val="tx1">
+                  <a:tint val="75000"/>
+                </a:schemeClr>
+              </a:solidFill>
+            </a:endParaRPr>
+          </a:p>
+          <a:p>
+            <a:r>
+              <a:rPr lang="es-AR" sz="2800" dirty="0">
+                <a:solidFill>
+                  <a:schemeClr val="tx1">
+                    <a:tint val="75000"/>
+                  </a:schemeClr>
+                </a:solidFill>
+              </a:rPr>
+              <a:t>    </a:t>
+            </a:r>
+            <a:r>
+              <a:rPr lang="es-AR" sz="2800" dirty="0">
+                <a:solidFill>
+                  <a:schemeClr val="tx1">
+                    <a:lumMod val="75000"/>
+                    <a:lumOff val="25000"/>
+                  </a:schemeClr>
+                </a:solidFill>
+              </a:rPr>
+              <a:t>&lt;/p&gt;</a:t>
+            </a:r>
+          </a:p>
+          <a:p>
+            <a:endParaRPr lang="es-AR" dirty="0"/>
+          </a:p>
+          <a:p>
+            <a:endParaRPr lang="es-AR" dirty="0"/>
+          </a:p>
+          <a:p>
+            <a:endParaRPr lang="es-AR" dirty="0"/>
+          </a:p>
+        </p:txBody>
+      </p:sp>
+      <p:pic>
+        <p:nvPicPr>
+          <p:cNvPr id="3" name="Imagen 2">
+            <a:extLst>
+              <a:ext uri="{FF2B5EF4-FFF2-40B4-BE49-F238E27FC236}">
+                <a16:creationId xmlns:a16="http://schemas.microsoft.com/office/drawing/2014/main" id="{47FCC270-751D-421D-8FF5-2893EB16BAB0}"/>
+              </a:ext>
+            </a:extLst>
+          </p:cNvPr>
+          <p:cNvPicPr>
+            <a:picLocks noChangeAspect="1"/>
+          </p:cNvPicPr>
+          <p:nvPr/>
+        </p:nvPicPr>
+        <p:blipFill>
+          <a:blip r:embed="rId2"/>
+          <a:stretch>
+            <a:fillRect/>
+          </a:stretch>
+        </p:blipFill>
+        <p:spPr>
+          <a:xfrm>
+            <a:off x="5752213" y="5119355"/>
+            <a:ext cx="6223811" cy="1430301"/>
+          </a:xfrm>
+          <a:prstGeom prst="rect">
+            <a:avLst/>
+          </a:prstGeom>
+        </p:spPr>
+      </p:pic>
+    </p:spTree>
+    <p:extLst>
+      <p:ext uri="{BB962C8B-B14F-4D97-AF65-F5344CB8AC3E}">
+        <p14:creationId xmlns:p14="http://schemas.microsoft.com/office/powerpoint/2010/main" val="493179824"/>
+      </p:ext>
+    </p:extLst>
+  </p:cSld>
+  <p:clrMapOvr>
+    <a:masterClrMapping/>
+  </p:clrMapOvr>
+</p:sld>
+</file>
+
+<file path=ppt/slides/slide13.xml><?xml version="1.0" encoding="utf-8"?>
+<p:sld xmlns:a="http://schemas.openxmlformats.org/drawingml/2006/main" xmlns:r="http://schemas.openxmlformats.org/officeDocument/2006/relationships" xmlns:p="http://schemas.openxmlformats.org/presentationml/2006/main">
+  <p:cSld>
+    <p:spTree>
+      <p:nvGrpSpPr>
+        <p:cNvPr id="1" name=""/>
+        <p:cNvGrpSpPr/>
+        <p:nvPr/>
+      </p:nvGrpSpPr>
+      <p:grpSpPr>
+        <a:xfrm>
+          <a:off x="0" y="0"/>
+          <a:ext cx="0" cy="0"/>
+          <a:chOff x="0" y="0"/>
+          <a:chExt cx="0" cy="0"/>
+        </a:xfrm>
+      </p:grpSpPr>
+      <p:sp>
+        <p:nvSpPr>
+          <p:cNvPr id="3" name="Marcador de contenido 2">
+            <a:extLst>
+              <a:ext uri="{FF2B5EF4-FFF2-40B4-BE49-F238E27FC236}">
+                <a16:creationId xmlns:a16="http://schemas.microsoft.com/office/drawing/2014/main" id="{E41D76BF-7E0D-44AF-899B-8066F20356EE}"/>
+              </a:ext>
+            </a:extLst>
+          </p:cNvPr>
+          <p:cNvSpPr>
+            <a:spLocks noGrp="1"/>
+          </p:cNvSpPr>
+          <p:nvPr>
+            <p:ph idx="1"/>
+          </p:nvPr>
+        </p:nvSpPr>
+        <p:spPr>
+          <a:xfrm>
+            <a:off x="127591" y="191386"/>
+            <a:ext cx="11865935" cy="6539023"/>
+          </a:xfrm>
+        </p:spPr>
+        <p:txBody>
+          <a:bodyPr/>
+          <a:lstStyle/>
+          <a:p>
+            <a:pPr marL="0" indent="0" algn="ctr">
+              <a:buNone/>
+            </a:pPr>
+            <a:r>
+              <a:rPr lang="es-AR" sz="4000" u="sng" dirty="0">
+                <a:solidFill>
+                  <a:schemeClr val="tx1">
+                    <a:lumMod val="65000"/>
+                    <a:lumOff val="35000"/>
+                  </a:schemeClr>
+                </a:solidFill>
+                <a:latin typeface="+mj-lt"/>
+                <a:ea typeface="+mj-ea"/>
+                <a:cs typeface="+mj-cs"/>
+              </a:rPr>
+              <a:t>Tablas simples</a:t>
+            </a:r>
+          </a:p>
+          <a:p>
+            <a:pPr marL="0" indent="0">
+              <a:buNone/>
+            </a:pPr>
+            <a:endParaRPr lang="es-AR" dirty="0"/>
+          </a:p>
+          <a:p>
+            <a:pPr marL="0" indent="0">
+              <a:buNone/>
+            </a:pPr>
+            <a:r>
+              <a:rPr lang="es-AR" dirty="0"/>
+              <a:t>	</a:t>
+            </a:r>
+          </a:p>
+          <a:p>
+            <a:pPr marL="0" indent="0">
+              <a:buNone/>
+            </a:pPr>
+            <a:endParaRPr lang="es-AR" dirty="0"/>
+          </a:p>
+        </p:txBody>
+      </p:sp>
+      <p:pic>
+        <p:nvPicPr>
+          <p:cNvPr id="4" name="Imagen 3">
+            <a:extLst>
+              <a:ext uri="{FF2B5EF4-FFF2-40B4-BE49-F238E27FC236}">
+                <a16:creationId xmlns:a16="http://schemas.microsoft.com/office/drawing/2014/main" id="{3CF98341-D103-417E-8E3A-556A492072BA}"/>
+              </a:ext>
+            </a:extLst>
+          </p:cNvPr>
+          <p:cNvPicPr>
+            <a:picLocks noChangeAspect="1"/>
+          </p:cNvPicPr>
+          <p:nvPr/>
+        </p:nvPicPr>
+        <p:blipFill>
+          <a:blip r:embed="rId2"/>
+          <a:stretch>
+            <a:fillRect/>
+          </a:stretch>
+        </p:blipFill>
+        <p:spPr>
+          <a:xfrm>
+            <a:off x="6347637" y="1951073"/>
+            <a:ext cx="4114800" cy="2440173"/>
+          </a:xfrm>
+          <a:prstGeom prst="rect">
+            <a:avLst/>
+          </a:prstGeom>
+        </p:spPr>
+      </p:pic>
+      <p:pic>
+        <p:nvPicPr>
+          <p:cNvPr id="5" name="Imagen 4">
+            <a:extLst>
+              <a:ext uri="{FF2B5EF4-FFF2-40B4-BE49-F238E27FC236}">
+                <a16:creationId xmlns:a16="http://schemas.microsoft.com/office/drawing/2014/main" id="{F015D5A3-E7AA-48C8-8CA8-695D5CE6F3BC}"/>
+              </a:ext>
+            </a:extLst>
+          </p:cNvPr>
+          <p:cNvPicPr>
+            <a:picLocks noChangeAspect="1"/>
+          </p:cNvPicPr>
+          <p:nvPr/>
+        </p:nvPicPr>
+        <p:blipFill>
+          <a:blip r:embed="rId3"/>
+          <a:stretch>
+            <a:fillRect/>
+          </a:stretch>
+        </p:blipFill>
+        <p:spPr>
+          <a:xfrm>
+            <a:off x="698205" y="1120959"/>
+            <a:ext cx="4437321" cy="3918874"/>
+          </a:xfrm>
+          <a:prstGeom prst="rect">
+            <a:avLst/>
+          </a:prstGeom>
+        </p:spPr>
+      </p:pic>
+      <p:sp>
+        <p:nvSpPr>
+          <p:cNvPr id="6" name="CuadroTexto 5">
+            <a:extLst>
+              <a:ext uri="{FF2B5EF4-FFF2-40B4-BE49-F238E27FC236}">
+                <a16:creationId xmlns:a16="http://schemas.microsoft.com/office/drawing/2014/main" id="{E15EFC7F-5DEA-48CB-A408-3D9CEF5761C5}"/>
+              </a:ext>
+            </a:extLst>
+          </p:cNvPr>
+          <p:cNvSpPr txBox="1"/>
+          <p:nvPr/>
+        </p:nvSpPr>
+        <p:spPr>
+          <a:xfrm>
+            <a:off x="455428" y="5319936"/>
+            <a:ext cx="9360195" cy="1384995"/>
+          </a:xfrm>
+          <a:prstGeom prst="rect">
+            <a:avLst/>
+          </a:prstGeom>
+          <a:noFill/>
+        </p:spPr>
+        <p:txBody>
+          <a:bodyPr wrap="square" rtlCol="0">
+            <a:spAutoFit/>
+          </a:bodyPr>
+          <a:lstStyle/>
+          <a:p>
+            <a:r>
+              <a:rPr lang="es-AR" sz="2800" dirty="0">
+                <a:solidFill>
+                  <a:schemeClr val="tx1">
+                    <a:lumMod val="75000"/>
+                    <a:lumOff val="25000"/>
+                  </a:schemeClr>
+                </a:solidFill>
+              </a:rPr>
+              <a:t>&lt;tr&gt; </a:t>
+            </a:r>
+            <a:r>
+              <a:rPr lang="es-AR" sz="2800" dirty="0">
+                <a:solidFill>
+                  <a:schemeClr val="tx1">
+                    <a:tint val="75000"/>
+                  </a:schemeClr>
+                </a:solidFill>
+              </a:rPr>
+              <a:t>fila de tabla</a:t>
+            </a:r>
+          </a:p>
+          <a:p>
+            <a:r>
+              <a:rPr lang="es-AR" sz="2800" dirty="0">
+                <a:solidFill>
+                  <a:schemeClr val="tx1">
+                    <a:lumMod val="75000"/>
+                    <a:lumOff val="25000"/>
+                  </a:schemeClr>
+                </a:solidFill>
+              </a:rPr>
+              <a:t>&lt;th&gt; </a:t>
+            </a:r>
+            <a:r>
+              <a:rPr lang="es-AR" sz="2800" dirty="0">
+                <a:solidFill>
+                  <a:schemeClr val="tx1">
+                    <a:tint val="75000"/>
+                  </a:schemeClr>
+                </a:solidFill>
+              </a:rPr>
+              <a:t>celda de cabecera de tabla </a:t>
+            </a:r>
+          </a:p>
+          <a:p>
+            <a:r>
+              <a:rPr lang="es-AR" sz="2800" dirty="0">
+                <a:solidFill>
+                  <a:schemeClr val="tx1">
+                    <a:lumMod val="75000"/>
+                    <a:lumOff val="25000"/>
+                  </a:schemeClr>
+                </a:solidFill>
+              </a:rPr>
+              <a:t>&lt;td&gt; </a:t>
+            </a:r>
+            <a:r>
+              <a:rPr lang="es-AR" sz="2800" dirty="0">
+                <a:solidFill>
+                  <a:schemeClr val="tx1">
+                    <a:tint val="75000"/>
+                  </a:schemeClr>
+                </a:solidFill>
+              </a:rPr>
+              <a:t>celda de tabla</a:t>
+            </a:r>
+            <a:r>
+              <a:rPr lang="es-AR" dirty="0"/>
+              <a:t> </a:t>
+            </a:r>
+          </a:p>
+        </p:txBody>
+      </p:sp>
+    </p:spTree>
+    <p:extLst>
+      <p:ext uri="{BB962C8B-B14F-4D97-AF65-F5344CB8AC3E}">
+        <p14:creationId xmlns:p14="http://schemas.microsoft.com/office/powerpoint/2010/main" val="1779229687"/>
+      </p:ext>
+    </p:extLst>
+  </p:cSld>
+  <p:clrMapOvr>
+    <a:masterClrMapping/>
+  </p:clrMapOvr>
+</p:sld>
+</file>
+
+<file path=ppt/slides/slide14.xml><?xml version="1.0" encoding="utf-8"?>
+<p:sld xmlns:a="http://schemas.openxmlformats.org/drawingml/2006/main" xmlns:r="http://schemas.openxmlformats.org/officeDocument/2006/relationships" xmlns:p="http://schemas.openxmlformats.org/presentationml/2006/main">
+  <p:cSld>
+    <p:spTree>
+      <p:nvGrpSpPr>
+        <p:cNvPr id="1" name=""/>
+        <p:cNvGrpSpPr/>
+        <p:nvPr/>
+      </p:nvGrpSpPr>
+      <p:grpSpPr>
+        <a:xfrm>
+          <a:off x="0" y="0"/>
+          <a:ext cx="0" cy="0"/>
+          <a:chOff x="0" y="0"/>
+          <a:chExt cx="0" cy="0"/>
+        </a:xfrm>
+      </p:grpSpPr>
+      <p:pic>
+        <p:nvPicPr>
+          <p:cNvPr id="4" name="Imagen 3">
+            <a:extLst>
+              <a:ext uri="{FF2B5EF4-FFF2-40B4-BE49-F238E27FC236}">
+                <a16:creationId xmlns:a16="http://schemas.microsoft.com/office/drawing/2014/main" id="{F640554D-E0CD-4B8A-8086-426A4847246F}"/>
+              </a:ext>
+            </a:extLst>
+          </p:cNvPr>
+          <p:cNvPicPr>
+            <a:picLocks noChangeAspect="1"/>
+          </p:cNvPicPr>
+          <p:nvPr/>
+        </p:nvPicPr>
+        <p:blipFill>
+          <a:blip r:embed="rId2"/>
+          <a:stretch>
+            <a:fillRect/>
+          </a:stretch>
+        </p:blipFill>
+        <p:spPr>
+          <a:xfrm>
+            <a:off x="6539024" y="1935257"/>
+            <a:ext cx="5053014" cy="2413328"/>
+          </a:xfrm>
+          <a:prstGeom prst="rect">
+            <a:avLst/>
+          </a:prstGeom>
+        </p:spPr>
+      </p:pic>
+      <p:sp>
+        <p:nvSpPr>
+          <p:cNvPr id="5" name="CuadroTexto 4">
+            <a:extLst>
+              <a:ext uri="{FF2B5EF4-FFF2-40B4-BE49-F238E27FC236}">
+                <a16:creationId xmlns:a16="http://schemas.microsoft.com/office/drawing/2014/main" id="{0BF147E7-FA02-4C31-B576-2610D83F2D48}"/>
+              </a:ext>
+            </a:extLst>
+          </p:cNvPr>
+          <p:cNvSpPr txBox="1"/>
+          <p:nvPr/>
+        </p:nvSpPr>
+        <p:spPr>
+          <a:xfrm>
+            <a:off x="318978" y="183561"/>
+            <a:ext cx="11727710" cy="707886"/>
+          </a:xfrm>
+          <a:prstGeom prst="rect">
+            <a:avLst/>
+          </a:prstGeom>
+          <a:noFill/>
+        </p:spPr>
+        <p:txBody>
+          <a:bodyPr wrap="square" rtlCol="0">
+            <a:spAutoFit/>
+          </a:bodyPr>
+          <a:lstStyle/>
+          <a:p>
+            <a:pPr algn="ctr"/>
+            <a:r>
+              <a:rPr lang="es-AR" sz="4000" u="sng" dirty="0">
+                <a:solidFill>
+                  <a:schemeClr val="tx1">
+                    <a:lumMod val="65000"/>
+                    <a:lumOff val="35000"/>
+                  </a:schemeClr>
+                </a:solidFill>
+                <a:latin typeface="+mj-lt"/>
+                <a:ea typeface="+mj-ea"/>
+                <a:cs typeface="+mj-cs"/>
+              </a:rPr>
+              <a:t>Colspan y Rowspan</a:t>
+            </a:r>
+          </a:p>
+        </p:txBody>
+      </p:sp>
+      <p:pic>
+        <p:nvPicPr>
+          <p:cNvPr id="6" name="Imagen 5">
+            <a:extLst>
+              <a:ext uri="{FF2B5EF4-FFF2-40B4-BE49-F238E27FC236}">
+                <a16:creationId xmlns:a16="http://schemas.microsoft.com/office/drawing/2014/main" id="{D2BAECCE-5664-42B9-AD84-D6290A9A5AA6}"/>
+              </a:ext>
+            </a:extLst>
+          </p:cNvPr>
+          <p:cNvPicPr>
+            <a:picLocks noChangeAspect="1"/>
+          </p:cNvPicPr>
+          <p:nvPr/>
+        </p:nvPicPr>
+        <p:blipFill>
+          <a:blip r:embed="rId3"/>
+          <a:stretch>
+            <a:fillRect/>
+          </a:stretch>
+        </p:blipFill>
+        <p:spPr>
+          <a:xfrm>
+            <a:off x="599962" y="1199792"/>
+            <a:ext cx="4301647" cy="4240472"/>
+          </a:xfrm>
+          <a:prstGeom prst="rect">
+            <a:avLst/>
+          </a:prstGeom>
+        </p:spPr>
+      </p:pic>
+      <p:sp>
+        <p:nvSpPr>
+          <p:cNvPr id="7" name="CuadroTexto 6">
+            <a:extLst>
+              <a:ext uri="{FF2B5EF4-FFF2-40B4-BE49-F238E27FC236}">
+                <a16:creationId xmlns:a16="http://schemas.microsoft.com/office/drawing/2014/main" id="{9A08A953-022A-4DD5-8B65-9C1B00636FB5}"/>
+              </a:ext>
+            </a:extLst>
+          </p:cNvPr>
+          <p:cNvSpPr txBox="1"/>
+          <p:nvPr/>
+        </p:nvSpPr>
+        <p:spPr>
+          <a:xfrm>
+            <a:off x="576427" y="5960854"/>
+            <a:ext cx="8650363" cy="523220"/>
+          </a:xfrm>
+          <a:prstGeom prst="rect">
+            <a:avLst/>
+          </a:prstGeom>
+          <a:noFill/>
+        </p:spPr>
+        <p:txBody>
+          <a:bodyPr wrap="square" rtlCol="0">
+            <a:spAutoFit/>
+          </a:bodyPr>
+          <a:lstStyle/>
+          <a:p>
+            <a:r>
+              <a:rPr lang="es-AR" sz="2800" dirty="0" err="1">
+                <a:solidFill>
+                  <a:schemeClr val="tx1">
+                    <a:lumMod val="75000"/>
+                    <a:lumOff val="25000"/>
+                  </a:schemeClr>
+                </a:solidFill>
+              </a:rPr>
+              <a:t>rowspan</a:t>
+            </a:r>
+            <a:r>
+              <a:rPr lang="es-AR" sz="2800" dirty="0">
+                <a:solidFill>
+                  <a:schemeClr val="tx1">
+                    <a:tint val="75000"/>
+                  </a:schemeClr>
+                </a:solidFill>
+              </a:rPr>
+              <a:t> indica cuantas filas ocupa la celda.</a:t>
+            </a:r>
+          </a:p>
+        </p:txBody>
+      </p:sp>
+    </p:spTree>
+    <p:extLst>
+      <p:ext uri="{BB962C8B-B14F-4D97-AF65-F5344CB8AC3E}">
+        <p14:creationId xmlns:p14="http://schemas.microsoft.com/office/powerpoint/2010/main" val="2664445443"/>
+      </p:ext>
+    </p:extLst>
+  </p:cSld>
+  <p:clrMapOvr>
+    <a:masterClrMapping/>
+  </p:clrMapOvr>
+</p:sld>
+</file>
+
+<file path=ppt/slides/slide15.xml><?xml version="1.0" encoding="utf-8"?>
+<p:sld xmlns:a="http://schemas.openxmlformats.org/drawingml/2006/main" xmlns:r="http://schemas.openxmlformats.org/officeDocument/2006/relationships" xmlns:p="http://schemas.openxmlformats.org/presentationml/2006/main">
+  <p:cSld>
+    <p:spTree>
+      <p:nvGrpSpPr>
+        <p:cNvPr id="1" name=""/>
+        <p:cNvGrpSpPr/>
+        <p:nvPr/>
+      </p:nvGrpSpPr>
+      <p:grpSpPr>
+        <a:xfrm>
+          <a:off x="0" y="0"/>
+          <a:ext cx="0" cy="0"/>
+          <a:chOff x="0" y="0"/>
+          <a:chExt cx="0" cy="0"/>
+        </a:xfrm>
+      </p:grpSpPr>
+      <p:pic>
+        <p:nvPicPr>
+          <p:cNvPr id="4" name="Imagen 3">
+            <a:extLst>
+              <a:ext uri="{FF2B5EF4-FFF2-40B4-BE49-F238E27FC236}">
+                <a16:creationId xmlns:a16="http://schemas.microsoft.com/office/drawing/2014/main" id="{F7370229-8C7E-4B90-BE68-34F5D95369F9}"/>
+              </a:ext>
+            </a:extLst>
+          </p:cNvPr>
+          <p:cNvPicPr>
+            <a:picLocks noChangeAspect="1"/>
+          </p:cNvPicPr>
+          <p:nvPr/>
+        </p:nvPicPr>
+        <p:blipFill>
+          <a:blip r:embed="rId2"/>
+          <a:stretch>
+            <a:fillRect/>
+          </a:stretch>
+        </p:blipFill>
+        <p:spPr>
+          <a:xfrm>
+            <a:off x="6325153" y="1091055"/>
+            <a:ext cx="5203310" cy="2874889"/>
+          </a:xfrm>
+          <a:prstGeom prst="rect">
+            <a:avLst/>
+          </a:prstGeom>
+        </p:spPr>
+      </p:pic>
+      <p:sp>
+        <p:nvSpPr>
+          <p:cNvPr id="6" name="CuadroTexto 5">
+            <a:extLst>
+              <a:ext uri="{FF2B5EF4-FFF2-40B4-BE49-F238E27FC236}">
+                <a16:creationId xmlns:a16="http://schemas.microsoft.com/office/drawing/2014/main" id="{8A31DBD7-853B-4BB7-8443-7D1F6CF42770}"/>
+              </a:ext>
+            </a:extLst>
+          </p:cNvPr>
+          <p:cNvSpPr txBox="1"/>
+          <p:nvPr/>
+        </p:nvSpPr>
+        <p:spPr>
+          <a:xfrm>
+            <a:off x="69889" y="5120614"/>
+            <a:ext cx="12040595" cy="1384995"/>
+          </a:xfrm>
+          <a:prstGeom prst="rect">
+            <a:avLst/>
+          </a:prstGeom>
+          <a:noFill/>
+        </p:spPr>
+        <p:txBody>
+          <a:bodyPr wrap="square" rtlCol="0">
+            <a:spAutoFit/>
+          </a:bodyPr>
+          <a:lstStyle/>
+          <a:p>
+            <a:r>
+              <a:rPr lang="es-AR" sz="2800" dirty="0" err="1">
+                <a:solidFill>
+                  <a:schemeClr val="tx1">
+                    <a:lumMod val="75000"/>
+                    <a:lumOff val="25000"/>
+                  </a:schemeClr>
+                </a:solidFill>
+              </a:rPr>
+              <a:t>colspan</a:t>
+            </a:r>
+            <a:r>
+              <a:rPr lang="es-AR" sz="2800" dirty="0">
+                <a:solidFill>
+                  <a:schemeClr val="tx1">
+                    <a:tint val="75000"/>
+                  </a:schemeClr>
+                </a:solidFill>
+              </a:rPr>
+              <a:t> cuantos columnas ocupa la celda.</a:t>
+            </a:r>
+          </a:p>
+          <a:p>
+            <a:r>
+              <a:rPr lang="es-AR" sz="2800" dirty="0">
+                <a:solidFill>
+                  <a:schemeClr val="tx1">
+                    <a:tint val="75000"/>
+                  </a:schemeClr>
+                </a:solidFill>
+              </a:rPr>
+              <a:t>Atributo </a:t>
+            </a:r>
+            <a:r>
+              <a:rPr lang="es-AR" sz="2800" dirty="0">
+                <a:solidFill>
+                  <a:schemeClr val="tx1">
+                    <a:lumMod val="75000"/>
+                    <a:lumOff val="25000"/>
+                  </a:schemeClr>
+                </a:solidFill>
+              </a:rPr>
+              <a:t>scope</a:t>
+            </a:r>
+            <a:r>
+              <a:rPr lang="es-AR" sz="2800" dirty="0">
+                <a:solidFill>
+                  <a:schemeClr val="tx1">
+                    <a:tint val="75000"/>
+                  </a:schemeClr>
+                </a:solidFill>
+              </a:rPr>
+              <a:t> indica de que es cabecera. Por ejemplo col indica que es cabera de las celdas de esa columna. </a:t>
+            </a:r>
+          </a:p>
+        </p:txBody>
+      </p:sp>
+      <p:pic>
+        <p:nvPicPr>
+          <p:cNvPr id="7" name="Imagen 6">
+            <a:extLst>
+              <a:ext uri="{FF2B5EF4-FFF2-40B4-BE49-F238E27FC236}">
+                <a16:creationId xmlns:a16="http://schemas.microsoft.com/office/drawing/2014/main" id="{85BE1C6D-A05C-4067-8A24-ACC1AFC1ED5A}"/>
+              </a:ext>
+            </a:extLst>
+          </p:cNvPr>
+          <p:cNvPicPr>
+            <a:picLocks noChangeAspect="1"/>
+          </p:cNvPicPr>
+          <p:nvPr/>
+        </p:nvPicPr>
+        <p:blipFill>
+          <a:blip r:embed="rId3"/>
+          <a:stretch>
+            <a:fillRect/>
+          </a:stretch>
+        </p:blipFill>
+        <p:spPr>
+          <a:xfrm>
+            <a:off x="69889" y="562418"/>
+            <a:ext cx="6076950" cy="4095750"/>
+          </a:xfrm>
+          <a:prstGeom prst="rect">
+            <a:avLst/>
+          </a:prstGeom>
+        </p:spPr>
+      </p:pic>
+    </p:spTree>
+    <p:extLst>
+      <p:ext uri="{BB962C8B-B14F-4D97-AF65-F5344CB8AC3E}">
+        <p14:creationId xmlns:p14="http://schemas.microsoft.com/office/powerpoint/2010/main" val="4025023956"/>
+      </p:ext>
+    </p:extLst>
+  </p:cSld>
+  <p:clrMapOvr>
+    <a:masterClrMapping/>
+  </p:clrMapOvr>
+</p:sld>
+</file>
+
+<file path=ppt/slides/slide16.xml><?xml version="1.0" encoding="utf-8"?>
+<p:sld xmlns:a="http://schemas.openxmlformats.org/drawingml/2006/main" xmlns:r="http://schemas.openxmlformats.org/officeDocument/2006/relationships" xmlns:p="http://schemas.openxmlformats.org/presentationml/2006/main">
+  <p:cSld>
+    <p:spTree>
+      <p:nvGrpSpPr>
+        <p:cNvPr id="1" name=""/>
+        <p:cNvGrpSpPr/>
+        <p:nvPr/>
+      </p:nvGrpSpPr>
+      <p:grpSpPr>
+        <a:xfrm>
+          <a:off x="0" y="0"/>
+          <a:ext cx="0" cy="0"/>
+          <a:chOff x="0" y="0"/>
+          <a:chExt cx="0" cy="0"/>
+        </a:xfrm>
+      </p:grpSpPr>
+      <p:sp>
+        <p:nvSpPr>
+          <p:cNvPr id="4" name="CuadroTexto 3">
+            <a:extLst>
+              <a:ext uri="{FF2B5EF4-FFF2-40B4-BE49-F238E27FC236}">
+                <a16:creationId xmlns:a16="http://schemas.microsoft.com/office/drawing/2014/main" id="{B0AA5A2E-CB94-401C-A36B-91EF1638B2EB}"/>
+              </a:ext>
+            </a:extLst>
+          </p:cNvPr>
+          <p:cNvSpPr txBox="1"/>
+          <p:nvPr/>
+        </p:nvSpPr>
+        <p:spPr>
+          <a:xfrm>
+            <a:off x="0" y="127589"/>
+            <a:ext cx="11940362" cy="1384995"/>
+          </a:xfrm>
+          <a:prstGeom prst="rect">
+            <a:avLst/>
+          </a:prstGeom>
+          <a:noFill/>
+        </p:spPr>
+        <p:txBody>
+          <a:bodyPr wrap="square" rtlCol="0">
+            <a:spAutoFit/>
+          </a:bodyPr>
+          <a:lstStyle/>
+          <a:p>
+            <a:r>
+              <a:rPr lang="es-AR" sz="2800" dirty="0">
+                <a:solidFill>
+                  <a:schemeClr val="tx1">
+                    <a:tint val="75000"/>
+                  </a:schemeClr>
+                </a:solidFill>
+              </a:rPr>
+              <a:t>Se puede dividir en secciones las tablas con las etiquetas con los atributos </a:t>
+            </a:r>
+            <a:r>
+              <a:rPr lang="es-AR" sz="2800" dirty="0">
+                <a:solidFill>
+                  <a:schemeClr val="tx1">
+                    <a:lumMod val="75000"/>
+                    <a:lumOff val="25000"/>
+                  </a:schemeClr>
+                </a:solidFill>
+              </a:rPr>
+              <a:t>thead</a:t>
+            </a:r>
+            <a:r>
+              <a:rPr lang="es-AR" sz="2800" dirty="0">
+                <a:solidFill>
+                  <a:schemeClr val="tx1">
+                    <a:tint val="75000"/>
+                  </a:schemeClr>
+                </a:solidFill>
+              </a:rPr>
+              <a:t>, </a:t>
+            </a:r>
+            <a:r>
+              <a:rPr lang="es-AR" sz="2800" dirty="0">
+                <a:solidFill>
+                  <a:schemeClr val="tx1">
+                    <a:lumMod val="75000"/>
+                    <a:lumOff val="25000"/>
+                  </a:schemeClr>
+                </a:solidFill>
+              </a:rPr>
+              <a:t>tfoot</a:t>
+            </a:r>
+            <a:r>
+              <a:rPr lang="es-AR" sz="2800" dirty="0">
+                <a:solidFill>
+                  <a:schemeClr val="tx1">
+                    <a:tint val="75000"/>
+                  </a:schemeClr>
+                </a:solidFill>
+              </a:rPr>
+              <a:t> y </a:t>
+            </a:r>
+            <a:r>
+              <a:rPr lang="es-AR" sz="2800" dirty="0">
+                <a:solidFill>
+                  <a:schemeClr val="tx1">
+                    <a:lumMod val="75000"/>
+                    <a:lumOff val="25000"/>
+                  </a:schemeClr>
+                </a:solidFill>
+              </a:rPr>
+              <a:t>tbody</a:t>
+            </a:r>
+            <a:r>
+              <a:rPr lang="es-AR" sz="2800" dirty="0">
+                <a:solidFill>
+                  <a:schemeClr val="tx1">
+                    <a:tint val="75000"/>
+                  </a:schemeClr>
+                </a:solidFill>
+              </a:rPr>
+              <a:t>.</a:t>
+            </a:r>
+          </a:p>
+          <a:p>
+            <a:r>
+              <a:rPr lang="es-AR" sz="2800" dirty="0">
+                <a:solidFill>
+                  <a:schemeClr val="tx1">
+                    <a:tint val="75000"/>
+                  </a:schemeClr>
+                </a:solidFill>
+              </a:rPr>
+              <a:t> Además esta etiqueta </a:t>
+            </a:r>
+            <a:r>
+              <a:rPr lang="es-AR" sz="2800" dirty="0">
+                <a:solidFill>
+                  <a:schemeClr val="tx1">
+                    <a:lumMod val="75000"/>
+                    <a:lumOff val="25000"/>
+                  </a:schemeClr>
+                </a:solidFill>
+              </a:rPr>
+              <a:t>caption</a:t>
+            </a:r>
+            <a:r>
+              <a:rPr lang="es-AR" sz="2800" dirty="0">
+                <a:solidFill>
+                  <a:schemeClr val="tx1">
+                    <a:tint val="75000"/>
+                  </a:schemeClr>
+                </a:solidFill>
+              </a:rPr>
+              <a:t> para indicar un título.</a:t>
+            </a:r>
+          </a:p>
+        </p:txBody>
+      </p:sp>
+      <p:pic>
+        <p:nvPicPr>
+          <p:cNvPr id="5" name="Imagen 4">
+            <a:extLst>
+              <a:ext uri="{FF2B5EF4-FFF2-40B4-BE49-F238E27FC236}">
+                <a16:creationId xmlns:a16="http://schemas.microsoft.com/office/drawing/2014/main" id="{CFAF0EDB-BBC3-4327-82B0-A5DA4C1CB7A8}"/>
+              </a:ext>
+            </a:extLst>
+          </p:cNvPr>
+          <p:cNvPicPr>
+            <a:picLocks noChangeAspect="1"/>
+          </p:cNvPicPr>
+          <p:nvPr/>
+        </p:nvPicPr>
+        <p:blipFill>
+          <a:blip r:embed="rId2"/>
+          <a:stretch>
+            <a:fillRect/>
+          </a:stretch>
+        </p:blipFill>
+        <p:spPr>
+          <a:xfrm>
+            <a:off x="120280" y="1512584"/>
+            <a:ext cx="7365041" cy="5915025"/>
+          </a:xfrm>
+          <a:prstGeom prst="rect">
+            <a:avLst/>
+          </a:prstGeom>
+        </p:spPr>
+      </p:pic>
+      <p:pic>
+        <p:nvPicPr>
+          <p:cNvPr id="6" name="Imagen 5">
+            <a:extLst>
+              <a:ext uri="{FF2B5EF4-FFF2-40B4-BE49-F238E27FC236}">
+                <a16:creationId xmlns:a16="http://schemas.microsoft.com/office/drawing/2014/main" id="{F4C4D0AE-7E7F-445D-8AF6-0FC5061E1B3C}"/>
+              </a:ext>
+            </a:extLst>
+          </p:cNvPr>
+          <p:cNvPicPr>
+            <a:picLocks noChangeAspect="1"/>
+          </p:cNvPicPr>
+          <p:nvPr/>
+        </p:nvPicPr>
+        <p:blipFill>
+          <a:blip r:embed="rId3"/>
+          <a:stretch>
+            <a:fillRect/>
+          </a:stretch>
+        </p:blipFill>
+        <p:spPr>
+          <a:xfrm>
+            <a:off x="7642595" y="2090183"/>
+            <a:ext cx="4429125" cy="2209800"/>
+          </a:xfrm>
+          <a:prstGeom prst="rect">
+            <a:avLst/>
+          </a:prstGeom>
+        </p:spPr>
+      </p:pic>
+    </p:spTree>
+    <p:extLst>
+      <p:ext uri="{BB962C8B-B14F-4D97-AF65-F5344CB8AC3E}">
+        <p14:creationId xmlns:p14="http://schemas.microsoft.com/office/powerpoint/2010/main" val="2922064906"/>
+      </p:ext>
+    </p:extLst>
+  </p:cSld>
+  <p:clrMapOvr>
+    <a:masterClrMapping/>
+  </p:clrMapOvr>
+</p:sld>
+</file>
+
+<file path=ppt/slides/slide17.xml><?xml version="1.0" encoding="utf-8"?>
+<p:sld xmlns:a="http://schemas.openxmlformats.org/drawingml/2006/main" xmlns:r="http://schemas.openxmlformats.org/officeDocument/2006/relationships" xmlns:p="http://schemas.openxmlformats.org/presentationml/2006/main">
+  <p:cSld>
+    <p:spTree>
+      <p:nvGrpSpPr>
+        <p:cNvPr id="1" name=""/>
+        <p:cNvGrpSpPr/>
+        <p:nvPr/>
+      </p:nvGrpSpPr>
+      <p:grpSpPr>
+        <a:xfrm>
+          <a:off x="0" y="0"/>
+          <a:ext cx="0" cy="0"/>
+          <a:chOff x="0" y="0"/>
+          <a:chExt cx="0" cy="0"/>
+        </a:xfrm>
+      </p:grpSpPr>
+      <p:sp>
+        <p:nvSpPr>
+          <p:cNvPr id="4" name="CuadroTexto 3">
+            <a:extLst>
+              <a:ext uri="{FF2B5EF4-FFF2-40B4-BE49-F238E27FC236}">
+                <a16:creationId xmlns:a16="http://schemas.microsoft.com/office/drawing/2014/main" id="{D96279AF-1449-4305-9B62-7C05593C5BF3}"/>
+              </a:ext>
+            </a:extLst>
+          </p:cNvPr>
+          <p:cNvSpPr txBox="1"/>
+          <p:nvPr/>
+        </p:nvSpPr>
+        <p:spPr>
+          <a:xfrm>
+            <a:off x="104553" y="106327"/>
+            <a:ext cx="11982893" cy="1138773"/>
+          </a:xfrm>
+          <a:prstGeom prst="rect">
+            <a:avLst/>
+          </a:prstGeom>
+          <a:noFill/>
+        </p:spPr>
+        <p:txBody>
+          <a:bodyPr wrap="square" rtlCol="0">
+            <a:spAutoFit/>
+          </a:bodyPr>
+          <a:lstStyle/>
+          <a:p>
+            <a:pPr algn="ctr"/>
+            <a:r>
+              <a:rPr lang="es-AR" sz="4000" u="sng" dirty="0">
+                <a:solidFill>
+                  <a:schemeClr val="tx1">
+                    <a:lumMod val="65000"/>
+                    <a:lumOff val="35000"/>
+                  </a:schemeClr>
+                </a:solidFill>
+                <a:latin typeface="+mj-lt"/>
+                <a:ea typeface="+mj-ea"/>
+                <a:cs typeface="+mj-cs"/>
+              </a:rPr>
+              <a:t>Divs</a:t>
+            </a:r>
+            <a:endParaRPr lang="es-AR" sz="2800" u="sng" dirty="0">
+              <a:solidFill>
+                <a:schemeClr val="tx1">
+                  <a:tint val="75000"/>
+                </a:schemeClr>
+              </a:solidFill>
+            </a:endParaRPr>
+          </a:p>
+          <a:p>
+            <a:r>
+              <a:rPr lang="es-AR" sz="2800" dirty="0">
+                <a:solidFill>
+                  <a:schemeClr val="tx1">
+                    <a:tint val="75000"/>
+                  </a:schemeClr>
+                </a:solidFill>
+              </a:rPr>
+              <a:t>Es una sección rectangular de un documento.</a:t>
+            </a:r>
+          </a:p>
+        </p:txBody>
+      </p:sp>
+      <p:pic>
+        <p:nvPicPr>
+          <p:cNvPr id="5" name="Imagen 4">
+            <a:extLst>
+              <a:ext uri="{FF2B5EF4-FFF2-40B4-BE49-F238E27FC236}">
+                <a16:creationId xmlns:a16="http://schemas.microsoft.com/office/drawing/2014/main" id="{62BCD218-016C-40D0-8273-258AD0A7F57D}"/>
+              </a:ext>
+            </a:extLst>
+          </p:cNvPr>
+          <p:cNvPicPr>
+            <a:picLocks noChangeAspect="1"/>
+          </p:cNvPicPr>
+          <p:nvPr/>
+        </p:nvPicPr>
+        <p:blipFill>
+          <a:blip r:embed="rId2"/>
+          <a:stretch>
+            <a:fillRect/>
+          </a:stretch>
+        </p:blipFill>
+        <p:spPr>
+          <a:xfrm>
+            <a:off x="355857" y="1306418"/>
+            <a:ext cx="8162925" cy="1209675"/>
+          </a:xfrm>
+          <a:prstGeom prst="rect">
+            <a:avLst/>
+          </a:prstGeom>
+        </p:spPr>
+      </p:pic>
+      <p:pic>
+        <p:nvPicPr>
+          <p:cNvPr id="6" name="Imagen 5">
+            <a:extLst>
+              <a:ext uri="{FF2B5EF4-FFF2-40B4-BE49-F238E27FC236}">
+                <a16:creationId xmlns:a16="http://schemas.microsoft.com/office/drawing/2014/main" id="{3B8655C1-75E2-4C09-8C14-DDD1EBBBC022}"/>
+              </a:ext>
+            </a:extLst>
+          </p:cNvPr>
+          <p:cNvPicPr>
+            <a:picLocks noChangeAspect="1"/>
+          </p:cNvPicPr>
+          <p:nvPr/>
+        </p:nvPicPr>
+        <p:blipFill>
+          <a:blip r:embed="rId3"/>
+          <a:stretch>
+            <a:fillRect/>
+          </a:stretch>
+        </p:blipFill>
+        <p:spPr>
+          <a:xfrm>
+            <a:off x="9830021" y="320084"/>
+            <a:ext cx="2257425" cy="2590800"/>
+          </a:xfrm>
+          <a:prstGeom prst="rect">
+            <a:avLst/>
+          </a:prstGeom>
+        </p:spPr>
+      </p:pic>
+      <p:sp>
+        <p:nvSpPr>
+          <p:cNvPr id="7" name="CuadroTexto 6">
+            <a:extLst>
+              <a:ext uri="{FF2B5EF4-FFF2-40B4-BE49-F238E27FC236}">
+                <a16:creationId xmlns:a16="http://schemas.microsoft.com/office/drawing/2014/main" id="{FFE331A3-3D55-4D50-8522-3A4757F8E9C7}"/>
+              </a:ext>
+            </a:extLst>
+          </p:cNvPr>
+          <p:cNvSpPr txBox="1"/>
+          <p:nvPr/>
+        </p:nvSpPr>
+        <p:spPr>
+          <a:xfrm>
+            <a:off x="0" y="2972202"/>
+            <a:ext cx="11899605" cy="4524315"/>
+          </a:xfrm>
+          <a:prstGeom prst="rect">
+            <a:avLst/>
+          </a:prstGeom>
+          <a:noFill/>
+        </p:spPr>
+        <p:txBody>
+          <a:bodyPr wrap="square" rtlCol="0">
+            <a:spAutoFit/>
+          </a:bodyPr>
+          <a:lstStyle/>
+          <a:p>
+            <a:r>
+              <a:rPr lang="es-AR" sz="2800" dirty="0">
+                <a:solidFill>
+                  <a:schemeClr val="tx1">
+                    <a:tint val="75000"/>
+                  </a:schemeClr>
+                </a:solidFill>
+              </a:rPr>
+              <a:t>En HTML5 hay divs con nombre propio por su sentido semántico.</a:t>
+            </a:r>
+          </a:p>
+          <a:p>
+            <a:r>
+              <a:rPr lang="es-AR" sz="2800" dirty="0">
+                <a:solidFill>
+                  <a:schemeClr val="tx1">
+                    <a:lumMod val="75000"/>
+                    <a:lumOff val="25000"/>
+                  </a:schemeClr>
+                </a:solidFill>
+              </a:rPr>
+              <a:t>&lt;header&gt; </a:t>
+            </a:r>
+            <a:r>
+              <a:rPr lang="es-AR" sz="2800" dirty="0">
+                <a:solidFill>
+                  <a:schemeClr val="tx1">
+                    <a:tint val="75000"/>
+                  </a:schemeClr>
+                </a:solidFill>
+              </a:rPr>
+              <a:t>Indica la cabecera de un documento o sección.</a:t>
+            </a:r>
+          </a:p>
+          <a:p>
+            <a:r>
+              <a:rPr lang="es-AR" sz="2800" dirty="0">
+                <a:solidFill>
+                  <a:schemeClr val="tx1">
+                    <a:lumMod val="75000"/>
+                    <a:lumOff val="25000"/>
+                  </a:schemeClr>
+                </a:solidFill>
+              </a:rPr>
+              <a:t>&lt;main&gt; </a:t>
+            </a:r>
+            <a:r>
+              <a:rPr lang="es-AR" sz="2800" dirty="0">
+                <a:solidFill>
+                  <a:schemeClr val="tx1">
+                    <a:tint val="75000"/>
+                  </a:schemeClr>
+                </a:solidFill>
+              </a:rPr>
+              <a:t>Contenido principal del documento.</a:t>
+            </a:r>
+          </a:p>
+          <a:p>
+            <a:r>
+              <a:rPr lang="es-AR" sz="2800" dirty="0">
+                <a:solidFill>
+                  <a:schemeClr val="tx1">
+                    <a:lumMod val="75000"/>
+                    <a:lumOff val="25000"/>
+                  </a:schemeClr>
+                </a:solidFill>
+              </a:rPr>
+              <a:t>&lt;nav&gt; </a:t>
+            </a:r>
+            <a:r>
+              <a:rPr lang="es-AR" sz="2800" dirty="0">
+                <a:solidFill>
+                  <a:schemeClr val="tx1">
+                    <a:tint val="75000"/>
+                  </a:schemeClr>
+                </a:solidFill>
+              </a:rPr>
+              <a:t>Define un conjunto de enlaces de navegación.</a:t>
+            </a:r>
+          </a:p>
+          <a:p>
+            <a:r>
+              <a:rPr lang="es-AR" sz="2800" dirty="0">
+                <a:solidFill>
+                  <a:schemeClr val="tx1">
+                    <a:lumMod val="75000"/>
+                    <a:lumOff val="25000"/>
+                  </a:schemeClr>
+                </a:solidFill>
+              </a:rPr>
+              <a:t>&lt;aside&gt; </a:t>
+            </a:r>
+            <a:r>
+              <a:rPr lang="es-AR" sz="2800" dirty="0">
+                <a:solidFill>
+                  <a:schemeClr val="tx1">
+                    <a:tint val="75000"/>
+                  </a:schemeClr>
+                </a:solidFill>
+              </a:rPr>
+              <a:t>Barra lateral.</a:t>
+            </a:r>
+          </a:p>
+          <a:p>
+            <a:r>
+              <a:rPr lang="es-AR" sz="2800" dirty="0">
+                <a:solidFill>
+                  <a:schemeClr val="tx1">
+                    <a:lumMod val="75000"/>
+                    <a:lumOff val="25000"/>
+                  </a:schemeClr>
+                </a:solidFill>
+              </a:rPr>
+              <a:t>&lt;article&gt;</a:t>
+            </a:r>
+            <a:r>
+              <a:rPr lang="es-AR" sz="2800" dirty="0">
+                <a:solidFill>
+                  <a:schemeClr val="tx1">
+                    <a:tint val="75000"/>
+                  </a:schemeClr>
+                </a:solidFill>
+              </a:rPr>
+              <a:t>Contenido independiente del resto del documento.</a:t>
+            </a:r>
+          </a:p>
+          <a:p>
+            <a:r>
+              <a:rPr lang="es-AR" sz="2800" dirty="0">
+                <a:solidFill>
+                  <a:schemeClr val="tx1">
+                    <a:lumMod val="75000"/>
+                    <a:lumOff val="25000"/>
+                  </a:schemeClr>
+                </a:solidFill>
+              </a:rPr>
+              <a:t>&lt;section&gt; </a:t>
+            </a:r>
+            <a:r>
+              <a:rPr lang="es-AR" sz="2800" dirty="0">
+                <a:solidFill>
+                  <a:schemeClr val="tx1">
+                    <a:tint val="75000"/>
+                  </a:schemeClr>
+                </a:solidFill>
+              </a:rPr>
+              <a:t>Sección de un documento.</a:t>
+            </a:r>
+          </a:p>
+          <a:p>
+            <a:r>
+              <a:rPr lang="es-AR" sz="2800" dirty="0">
+                <a:solidFill>
+                  <a:schemeClr val="tx1">
+                    <a:lumMod val="75000"/>
+                    <a:lumOff val="25000"/>
+                  </a:schemeClr>
+                </a:solidFill>
+              </a:rPr>
+              <a:t>&lt;footer&gt; </a:t>
+            </a:r>
+            <a:r>
+              <a:rPr lang="es-AR" sz="2800" dirty="0">
+                <a:solidFill>
+                  <a:schemeClr val="tx1">
+                    <a:tint val="75000"/>
+                  </a:schemeClr>
+                </a:solidFill>
+              </a:rPr>
+              <a:t>Pie de pagina de documento o sección.</a:t>
+            </a:r>
+          </a:p>
+          <a:p>
+            <a:endParaRPr lang="es-AR" sz="2800" dirty="0">
+              <a:solidFill>
+                <a:schemeClr val="tx1">
+                  <a:tint val="75000"/>
+                </a:schemeClr>
+              </a:solidFill>
+            </a:endParaRPr>
+          </a:p>
+          <a:p>
+            <a:endParaRPr lang="es-AR" dirty="0"/>
+          </a:p>
+          <a:p>
+            <a:endParaRPr lang="es-AR" dirty="0"/>
+          </a:p>
+        </p:txBody>
+      </p:sp>
+      <p:pic>
+        <p:nvPicPr>
+          <p:cNvPr id="8" name="Imagen 7">
+            <a:extLst>
+              <a:ext uri="{FF2B5EF4-FFF2-40B4-BE49-F238E27FC236}">
+                <a16:creationId xmlns:a16="http://schemas.microsoft.com/office/drawing/2014/main" id="{B837AD66-2C4C-4F30-BE46-C298E379A8CF}"/>
+              </a:ext>
+            </a:extLst>
+          </p:cNvPr>
+          <p:cNvPicPr>
+            <a:picLocks noChangeAspect="1"/>
+          </p:cNvPicPr>
+          <p:nvPr/>
+        </p:nvPicPr>
+        <p:blipFill>
+          <a:blip r:embed="rId4"/>
+          <a:stretch>
+            <a:fillRect/>
+          </a:stretch>
+        </p:blipFill>
+        <p:spPr>
+          <a:xfrm>
+            <a:off x="8941981" y="3428999"/>
+            <a:ext cx="3349256" cy="3322673"/>
+          </a:xfrm>
+          <a:prstGeom prst="rect">
+            <a:avLst/>
+          </a:prstGeom>
+        </p:spPr>
+      </p:pic>
+    </p:spTree>
+    <p:extLst>
+      <p:ext uri="{BB962C8B-B14F-4D97-AF65-F5344CB8AC3E}">
+        <p14:creationId xmlns:p14="http://schemas.microsoft.com/office/powerpoint/2010/main" val="1780910245"/>
+      </p:ext>
+    </p:extLst>
+  </p:cSld>
+  <p:clrMapOvr>
+    <a:masterClrMapping/>
+  </p:clrMapOvr>
+</p:sld>
+</file>
+
 <file path=ppt/slides/slide2.xml><?xml version="1.0" encoding="utf-8"?>
 <p:sld xmlns:a="http://schemas.openxmlformats.org/drawingml/2006/main" xmlns:r="http://schemas.openxmlformats.org/officeDocument/2006/relationships" xmlns:p="http://schemas.openxmlformats.org/presentationml/2006/main">
   <p:cSld>
@@ -3829,8 +6435,8 @@
         </p:nvSpPr>
         <p:spPr>
           <a:xfrm>
-            <a:off x="178476" y="2023056"/>
-            <a:ext cx="12026900" cy="5262979"/>
+            <a:off x="0" y="3244027"/>
+            <a:ext cx="12205376" cy="3323987"/>
           </a:xfrm>
           <a:prstGeom prst="rect">
             <a:avLst/>
@@ -3843,6 +6449,11 @@
           </a:bodyPr>
           <a:lstStyle/>
           <a:p>
+            <a:pPr>
+              <a:lnSpc>
+                <a:spcPct val="150000"/>
+              </a:lnSpc>
+            </a:pPr>
             <a:r>
               <a:rPr lang="es-AR" sz="2800" dirty="0">
                 <a:solidFill>
@@ -3876,30 +6487,6 @@
                 </a:solidFill>
               </a:rPr>
               <a:t>El título va ha ser el título de la página web.</a:t>
-            </a:r>
-          </a:p>
-          <a:p>
-            <a:r>
-              <a:rPr lang="es-AR" sz="2800" dirty="0">
-                <a:solidFill>
-                  <a:schemeClr val="tx1">
-                    <a:tint val="75000"/>
-                  </a:schemeClr>
-                </a:solidFill>
-              </a:rPr>
-              <a:t>Las etiquetas se clasifican en de block o inline. Las etiquetas de bloque empiezan en un renglón nuevo, ocupan todo el espacio disponible y la etiqueta siguiente pasa al siguiente renglón, por ejemplo la etiqueta de párrafo.</a:t>
-            </a:r>
-          </a:p>
-          <a:p>
-            <a:r>
-              <a:rPr lang="es-AR" sz="2800" dirty="0">
-                <a:solidFill>
-                  <a:schemeClr val="tx1">
-                    <a:tint val="75000"/>
-                  </a:schemeClr>
-                </a:solidFill>
-              </a:rPr>
-              <a:t>Las etiquetas inline se insertan donde se encuentran, ocupan el espacio necesario y el contenido siguiente se inserta a continuación.</a:t>
             </a:r>
           </a:p>
           <a:p>
@@ -3928,7 +6515,7 @@
         <p:spPr>
           <a:xfrm>
             <a:off x="178476" y="289372"/>
-            <a:ext cx="10952998" cy="2092881"/>
+            <a:ext cx="10952998" cy="2954655"/>
           </a:xfrm>
           <a:prstGeom prst="rect">
             <a:avLst/>
@@ -3941,6 +6528,11 @@
           </a:bodyPr>
           <a:lstStyle/>
           <a:p>
+            <a:pPr>
+              <a:lnSpc>
+                <a:spcPct val="150000"/>
+              </a:lnSpc>
+            </a:pPr>
             <a:r>
               <a:rPr lang="es-AR" sz="2800" dirty="0">
                 <a:solidFill>
@@ -3995,6 +6587,11 @@
             </a:r>
           </a:p>
           <a:p>
+            <a:pPr>
+              <a:lnSpc>
+                <a:spcPct val="150000"/>
+              </a:lnSpc>
+            </a:pPr>
             <a:r>
               <a:rPr lang="es-AR" sz="2800" dirty="0">
                 <a:solidFill>
@@ -4028,6 +6625,11 @@
             </a:r>
           </a:p>
           <a:p>
+            <a:pPr>
+              <a:lnSpc>
+                <a:spcPct val="150000"/>
+              </a:lnSpc>
+            </a:pPr>
             <a:r>
               <a:rPr lang="es-AR" sz="2800" dirty="0">
                 <a:solidFill>
@@ -4040,6 +6642,11 @@
             </a:r>
           </a:p>
           <a:p>
+            <a:pPr>
+              <a:lnSpc>
+                <a:spcPct val="150000"/>
+              </a:lnSpc>
+            </a:pPr>
             <a:r>
               <a:rPr lang="es-AR" sz="2800" dirty="0">
                 <a:solidFill>
@@ -5460,10 +8067,1854 @@
           <a:chExt cx="0" cy="0"/>
         </a:xfrm>
       </p:grpSpPr>
+      <p:sp>
+        <p:nvSpPr>
+          <p:cNvPr id="3" name="Marcador de contenido 2">
+            <a:extLst>
+              <a:ext uri="{FF2B5EF4-FFF2-40B4-BE49-F238E27FC236}">
+                <a16:creationId xmlns:a16="http://schemas.microsoft.com/office/drawing/2014/main" id="{EE20670C-0C35-44CA-868D-A6DCE9FC502A}"/>
+              </a:ext>
+            </a:extLst>
+          </p:cNvPr>
+          <p:cNvSpPr>
+            <a:spLocks noGrp="1"/>
+          </p:cNvSpPr>
+          <p:nvPr>
+            <p:ph idx="1"/>
+          </p:nvPr>
+        </p:nvSpPr>
+        <p:spPr>
+          <a:xfrm>
+            <a:off x="199505" y="282633"/>
+            <a:ext cx="11671070" cy="5894330"/>
+          </a:xfrm>
+        </p:spPr>
+        <p:txBody>
+          <a:bodyPr>
+            <a:normAutofit fontScale="92500" lnSpcReduction="20000"/>
+          </a:bodyPr>
+          <a:lstStyle/>
+          <a:p>
+            <a:pPr marL="0" indent="0" algn="ctr">
+              <a:buNone/>
+            </a:pPr>
+            <a:r>
+              <a:rPr lang="es-AR" sz="4300" u="sng" dirty="0">
+                <a:solidFill>
+                  <a:schemeClr val="tx1">
+                    <a:lumMod val="65000"/>
+                    <a:lumOff val="35000"/>
+                  </a:schemeClr>
+                </a:solidFill>
+                <a:latin typeface="+mj-lt"/>
+                <a:ea typeface="+mj-ea"/>
+                <a:cs typeface="+mj-cs"/>
+              </a:rPr>
+              <a:t>Espacios en Blanco y saltos de línea</a:t>
+            </a:r>
+          </a:p>
+          <a:p>
+            <a:pPr algn="ctr"/>
+            <a:endParaRPr lang="es-AR" dirty="0">
+              <a:solidFill>
+                <a:schemeClr val="tx1">
+                  <a:tint val="75000"/>
+                </a:schemeClr>
+              </a:solidFill>
+            </a:endParaRPr>
+          </a:p>
+          <a:p>
+            <a:pPr marL="0" indent="0">
+              <a:buNone/>
+            </a:pPr>
+            <a:r>
+              <a:rPr lang="es-AR" sz="3000" dirty="0">
+                <a:solidFill>
+                  <a:schemeClr val="tx1">
+                    <a:tint val="75000"/>
+                  </a:schemeClr>
+                </a:solidFill>
+              </a:rPr>
+              <a:t>Al insertar espacios en blanco, tabulaciones y salto de línea HTML los representa en la página como un solo espacio en blanco.</a:t>
+            </a:r>
+          </a:p>
+          <a:p>
+            <a:pPr marL="0" indent="0">
+              <a:buNone/>
+            </a:pPr>
+            <a:r>
+              <a:rPr lang="es-AR" sz="3000" dirty="0">
+                <a:solidFill>
+                  <a:schemeClr val="tx1">
+                    <a:tint val="75000"/>
+                  </a:schemeClr>
+                </a:solidFill>
+              </a:rPr>
+              <a:t>Para introducir más de un blanco hay que escribir </a:t>
+            </a:r>
+            <a:r>
+              <a:rPr lang="es-AR" sz="3000" dirty="0">
+                <a:solidFill>
+                  <a:schemeClr val="tx1">
+                    <a:lumMod val="75000"/>
+                    <a:lumOff val="25000"/>
+                  </a:schemeClr>
+                </a:solidFill>
+              </a:rPr>
+              <a:t>&amp;</a:t>
+            </a:r>
+            <a:r>
+              <a:rPr lang="es-AR" sz="3000" dirty="0" err="1">
+                <a:solidFill>
+                  <a:schemeClr val="tx1">
+                    <a:lumMod val="75000"/>
+                    <a:lumOff val="25000"/>
+                  </a:schemeClr>
+                </a:solidFill>
+              </a:rPr>
+              <a:t>nbsp</a:t>
+            </a:r>
+            <a:r>
+              <a:rPr lang="es-AR" sz="3000" dirty="0">
+                <a:solidFill>
+                  <a:schemeClr val="tx1">
+                    <a:lumMod val="75000"/>
+                    <a:lumOff val="25000"/>
+                  </a:schemeClr>
+                </a:solidFill>
+              </a:rPr>
+              <a:t>; </a:t>
+            </a:r>
+            <a:r>
+              <a:rPr lang="es-AR" sz="3000" dirty="0">
+                <a:solidFill>
+                  <a:schemeClr val="tx1">
+                    <a:tint val="75000"/>
+                  </a:schemeClr>
+                </a:solidFill>
+              </a:rPr>
+              <a:t>y para insertar un salto de línea </a:t>
+            </a:r>
+            <a:r>
+              <a:rPr lang="es-AR" sz="3000" dirty="0">
+                <a:solidFill>
+                  <a:schemeClr val="tx1">
+                    <a:lumMod val="75000"/>
+                    <a:lumOff val="25000"/>
+                  </a:schemeClr>
+                </a:solidFill>
+              </a:rPr>
+              <a:t>&lt;</a:t>
+            </a:r>
+            <a:r>
+              <a:rPr lang="es-AR" sz="3000" dirty="0" err="1">
+                <a:solidFill>
+                  <a:schemeClr val="tx1">
+                    <a:lumMod val="75000"/>
+                    <a:lumOff val="25000"/>
+                  </a:schemeClr>
+                </a:solidFill>
+              </a:rPr>
+              <a:t>br</a:t>
+            </a:r>
+            <a:r>
+              <a:rPr lang="es-AR" sz="3000" dirty="0">
+                <a:solidFill>
+                  <a:schemeClr val="tx1">
+                    <a:lumMod val="75000"/>
+                    <a:lumOff val="25000"/>
+                  </a:schemeClr>
+                </a:solidFill>
+              </a:rPr>
+              <a:t>&gt;</a:t>
+            </a:r>
+          </a:p>
+          <a:p>
+            <a:pPr marL="0" indent="0">
+              <a:buNone/>
+            </a:pPr>
+            <a:r>
+              <a:rPr lang="es-AR" sz="3000" dirty="0">
+                <a:solidFill>
+                  <a:schemeClr val="tx1">
+                    <a:tint val="75000"/>
+                  </a:schemeClr>
+                </a:solidFill>
+              </a:rPr>
+              <a:t>Para no tener problemas con los caracteres acentuado y la ñ hay elegir la codificación utf-8.</a:t>
+            </a:r>
+          </a:p>
+          <a:p>
+            <a:pPr marL="0" indent="0">
+              <a:buNone/>
+            </a:pPr>
+            <a:r>
+              <a:rPr lang="es-AR" sz="3000" dirty="0">
+                <a:solidFill>
+                  <a:schemeClr val="tx1">
+                    <a:tint val="75000"/>
+                  </a:schemeClr>
+                </a:solidFill>
+              </a:rPr>
+              <a:t>Los caracteres más usados son.</a:t>
+            </a:r>
+          </a:p>
+          <a:p>
+            <a:pPr marL="0" indent="0">
+              <a:buNone/>
+            </a:pPr>
+            <a:r>
+              <a:rPr lang="es-AR" sz="3000" dirty="0">
+                <a:solidFill>
+                  <a:schemeClr val="tx1">
+                    <a:tint val="75000"/>
+                  </a:schemeClr>
+                </a:solidFill>
+              </a:rPr>
+              <a:t> á </a:t>
+            </a:r>
+            <a:r>
+              <a:rPr lang="es-AR" sz="3000" dirty="0">
+                <a:solidFill>
+                  <a:schemeClr val="tx1">
+                    <a:lumMod val="75000"/>
+                    <a:lumOff val="25000"/>
+                  </a:schemeClr>
+                </a:solidFill>
+              </a:rPr>
+              <a:t>&amp;</a:t>
+            </a:r>
+            <a:r>
+              <a:rPr lang="es-AR" sz="3000" dirty="0" err="1">
+                <a:solidFill>
+                  <a:schemeClr val="tx1">
+                    <a:lumMod val="75000"/>
+                    <a:lumOff val="25000"/>
+                  </a:schemeClr>
+                </a:solidFill>
+              </a:rPr>
+              <a:t>aacute</a:t>
+            </a:r>
+            <a:r>
+              <a:rPr lang="es-AR" sz="3000" dirty="0">
+                <a:solidFill>
+                  <a:schemeClr val="tx1">
+                    <a:lumMod val="75000"/>
+                    <a:lumOff val="25000"/>
+                  </a:schemeClr>
+                </a:solidFill>
+              </a:rPr>
+              <a:t>;</a:t>
+            </a:r>
+            <a:r>
+              <a:rPr lang="es-AR" sz="3000" dirty="0">
+                <a:solidFill>
+                  <a:schemeClr val="tx1">
+                    <a:tint val="75000"/>
+                  </a:schemeClr>
+                </a:solidFill>
+              </a:rPr>
+              <a:t>	é </a:t>
+            </a:r>
+            <a:r>
+              <a:rPr lang="es-AR" sz="3000" dirty="0">
+                <a:solidFill>
+                  <a:schemeClr val="tx1">
+                    <a:lumMod val="75000"/>
+                    <a:lumOff val="25000"/>
+                  </a:schemeClr>
+                </a:solidFill>
+              </a:rPr>
+              <a:t>&amp;</a:t>
+            </a:r>
+            <a:r>
+              <a:rPr lang="es-AR" sz="3000" dirty="0" err="1">
+                <a:solidFill>
+                  <a:schemeClr val="tx1">
+                    <a:lumMod val="75000"/>
+                    <a:lumOff val="25000"/>
+                  </a:schemeClr>
+                </a:solidFill>
+              </a:rPr>
+              <a:t>eacute</a:t>
+            </a:r>
+            <a:r>
+              <a:rPr lang="es-AR" sz="3000" dirty="0">
+                <a:solidFill>
+                  <a:schemeClr val="tx1">
+                    <a:lumMod val="75000"/>
+                    <a:lumOff val="25000"/>
+                  </a:schemeClr>
+                </a:solidFill>
+              </a:rPr>
+              <a:t>; </a:t>
+            </a:r>
+            <a:r>
+              <a:rPr lang="es-AR" sz="3000" dirty="0">
+                <a:solidFill>
+                  <a:schemeClr val="tx1">
+                    <a:tint val="75000"/>
+                  </a:schemeClr>
+                </a:solidFill>
+              </a:rPr>
+              <a:t>í </a:t>
+            </a:r>
+            <a:r>
+              <a:rPr lang="es-AR" sz="3000" dirty="0">
+                <a:solidFill>
+                  <a:schemeClr val="tx1">
+                    <a:lumMod val="75000"/>
+                    <a:lumOff val="25000"/>
+                  </a:schemeClr>
+                </a:solidFill>
+              </a:rPr>
+              <a:t>&amp;</a:t>
+            </a:r>
+            <a:r>
+              <a:rPr lang="es-AR" sz="3000" dirty="0" err="1">
+                <a:solidFill>
+                  <a:schemeClr val="tx1">
+                    <a:lumMod val="75000"/>
+                    <a:lumOff val="25000"/>
+                  </a:schemeClr>
+                </a:solidFill>
+              </a:rPr>
+              <a:t>iacute</a:t>
+            </a:r>
+            <a:r>
+              <a:rPr lang="es-AR" sz="3000" dirty="0">
+                <a:solidFill>
+                  <a:schemeClr val="tx1">
+                    <a:lumMod val="75000"/>
+                    <a:lumOff val="25000"/>
+                  </a:schemeClr>
+                </a:solidFill>
+              </a:rPr>
+              <a:t>; </a:t>
+            </a:r>
+            <a:r>
+              <a:rPr lang="es-AR" sz="3000" dirty="0" err="1">
+                <a:solidFill>
+                  <a:schemeClr val="tx1">
+                    <a:tint val="75000"/>
+                  </a:schemeClr>
+                </a:solidFill>
+              </a:rPr>
+              <a:t>ó</a:t>
+            </a:r>
+            <a:r>
+              <a:rPr lang="es-AR" sz="3000" dirty="0">
+                <a:solidFill>
+                  <a:schemeClr val="tx1">
+                    <a:tint val="75000"/>
+                  </a:schemeClr>
+                </a:solidFill>
+              </a:rPr>
+              <a:t> </a:t>
+            </a:r>
+            <a:r>
+              <a:rPr lang="es-AR" sz="3000" dirty="0">
+                <a:solidFill>
+                  <a:schemeClr val="tx1">
+                    <a:lumMod val="75000"/>
+                    <a:lumOff val="25000"/>
+                  </a:schemeClr>
+                </a:solidFill>
+              </a:rPr>
+              <a:t>&amp;</a:t>
+            </a:r>
+            <a:r>
+              <a:rPr lang="es-AR" sz="3000" dirty="0" err="1">
+                <a:solidFill>
+                  <a:schemeClr val="tx1">
+                    <a:lumMod val="75000"/>
+                    <a:lumOff val="25000"/>
+                  </a:schemeClr>
+                </a:solidFill>
+              </a:rPr>
+              <a:t>oacute</a:t>
+            </a:r>
+            <a:r>
+              <a:rPr lang="es-AR" sz="3000" dirty="0">
+                <a:solidFill>
+                  <a:schemeClr val="tx1">
+                    <a:lumMod val="75000"/>
+                    <a:lumOff val="25000"/>
+                  </a:schemeClr>
+                </a:solidFill>
+              </a:rPr>
+              <a:t>; </a:t>
+            </a:r>
+            <a:r>
+              <a:rPr lang="es-AR" sz="3000" dirty="0">
+                <a:solidFill>
+                  <a:schemeClr val="tx1">
+                    <a:tint val="75000"/>
+                  </a:schemeClr>
+                </a:solidFill>
+              </a:rPr>
+              <a:t>ú </a:t>
+            </a:r>
+            <a:r>
+              <a:rPr lang="es-AR" sz="3000" dirty="0">
+                <a:solidFill>
+                  <a:schemeClr val="tx1">
+                    <a:lumMod val="75000"/>
+                    <a:lumOff val="25000"/>
+                  </a:schemeClr>
+                </a:solidFill>
+              </a:rPr>
+              <a:t>&amp;</a:t>
+            </a:r>
+            <a:r>
+              <a:rPr lang="es-AR" sz="3000" dirty="0" err="1">
+                <a:solidFill>
+                  <a:schemeClr val="tx1">
+                    <a:lumMod val="75000"/>
+                    <a:lumOff val="25000"/>
+                  </a:schemeClr>
+                </a:solidFill>
+              </a:rPr>
+              <a:t>uacute</a:t>
+            </a:r>
+            <a:r>
+              <a:rPr lang="es-AR" sz="3000" dirty="0">
+                <a:solidFill>
+                  <a:schemeClr val="tx1">
+                    <a:lumMod val="75000"/>
+                    <a:lumOff val="25000"/>
+                  </a:schemeClr>
+                </a:solidFill>
+              </a:rPr>
+              <a:t>;</a:t>
+            </a:r>
+          </a:p>
+          <a:p>
+            <a:pPr marL="0" indent="0">
+              <a:buNone/>
+            </a:pPr>
+            <a:r>
+              <a:rPr lang="es-AR" sz="3000" dirty="0">
+                <a:solidFill>
+                  <a:schemeClr val="tx1">
+                    <a:tint val="75000"/>
+                  </a:schemeClr>
+                </a:solidFill>
+              </a:rPr>
+              <a:t>Á </a:t>
+            </a:r>
+            <a:r>
+              <a:rPr lang="es-AR" sz="3000" dirty="0">
+                <a:solidFill>
+                  <a:schemeClr val="tx1">
+                    <a:lumMod val="75000"/>
+                    <a:lumOff val="25000"/>
+                  </a:schemeClr>
+                </a:solidFill>
+              </a:rPr>
+              <a:t>&amp;</a:t>
+            </a:r>
+            <a:r>
+              <a:rPr lang="es-AR" sz="3000" dirty="0" err="1">
+                <a:solidFill>
+                  <a:schemeClr val="tx1">
+                    <a:lumMod val="75000"/>
+                    <a:lumOff val="25000"/>
+                  </a:schemeClr>
+                </a:solidFill>
+              </a:rPr>
+              <a:t>Aacute</a:t>
+            </a:r>
+            <a:r>
+              <a:rPr lang="es-AR" sz="3000" dirty="0">
+                <a:solidFill>
+                  <a:schemeClr val="tx1">
+                    <a:lumMod val="75000"/>
+                    <a:lumOff val="25000"/>
+                  </a:schemeClr>
+                </a:solidFill>
+              </a:rPr>
+              <a:t>; </a:t>
+            </a:r>
+            <a:r>
+              <a:rPr lang="es-AR" sz="3000" dirty="0">
+                <a:solidFill>
+                  <a:schemeClr val="tx1">
+                    <a:tint val="75000"/>
+                  </a:schemeClr>
+                </a:solidFill>
+              </a:rPr>
+              <a:t>É </a:t>
+            </a:r>
+            <a:r>
+              <a:rPr lang="es-AR" sz="3000" dirty="0">
+                <a:solidFill>
+                  <a:schemeClr val="tx1">
+                    <a:lumMod val="75000"/>
+                    <a:lumOff val="25000"/>
+                  </a:schemeClr>
+                </a:solidFill>
+              </a:rPr>
+              <a:t>&amp;</a:t>
+            </a:r>
+            <a:r>
+              <a:rPr lang="es-AR" sz="3000" dirty="0" err="1">
+                <a:solidFill>
+                  <a:schemeClr val="tx1">
+                    <a:lumMod val="75000"/>
+                    <a:lumOff val="25000"/>
+                  </a:schemeClr>
+                </a:solidFill>
+              </a:rPr>
+              <a:t>Eacute</a:t>
+            </a:r>
+            <a:r>
+              <a:rPr lang="es-AR" sz="3000" dirty="0">
+                <a:solidFill>
+                  <a:schemeClr val="tx1">
+                    <a:lumMod val="75000"/>
+                    <a:lumOff val="25000"/>
+                  </a:schemeClr>
+                </a:solidFill>
+              </a:rPr>
+              <a:t>; </a:t>
+            </a:r>
+            <a:r>
+              <a:rPr lang="es-AR" sz="3000" dirty="0">
+                <a:solidFill>
+                  <a:schemeClr val="tx1">
+                    <a:tint val="75000"/>
+                  </a:schemeClr>
+                </a:solidFill>
+              </a:rPr>
+              <a:t>Í </a:t>
+            </a:r>
+            <a:r>
+              <a:rPr lang="es-AR" sz="3000" dirty="0">
+                <a:solidFill>
+                  <a:schemeClr val="tx1">
+                    <a:lumMod val="75000"/>
+                    <a:lumOff val="25000"/>
+                  </a:schemeClr>
+                </a:solidFill>
+              </a:rPr>
+              <a:t>&amp;</a:t>
+            </a:r>
+            <a:r>
+              <a:rPr lang="es-AR" sz="3000" dirty="0" err="1">
+                <a:solidFill>
+                  <a:schemeClr val="tx1">
+                    <a:lumMod val="75000"/>
+                    <a:lumOff val="25000"/>
+                  </a:schemeClr>
+                </a:solidFill>
+              </a:rPr>
+              <a:t>Iacute</a:t>
+            </a:r>
+            <a:r>
+              <a:rPr lang="es-AR" sz="3000" dirty="0">
+                <a:solidFill>
+                  <a:schemeClr val="tx1">
+                    <a:lumMod val="75000"/>
+                    <a:lumOff val="25000"/>
+                  </a:schemeClr>
+                </a:solidFill>
+              </a:rPr>
+              <a:t>; </a:t>
+            </a:r>
+            <a:r>
+              <a:rPr lang="es-AR" sz="3000" dirty="0" err="1">
+                <a:solidFill>
+                  <a:schemeClr val="tx1">
+                    <a:tint val="75000"/>
+                  </a:schemeClr>
+                </a:solidFill>
+              </a:rPr>
+              <a:t>Ó</a:t>
+            </a:r>
+            <a:r>
+              <a:rPr lang="es-AR" sz="3000" dirty="0">
+                <a:solidFill>
+                  <a:schemeClr val="tx1">
+                    <a:tint val="75000"/>
+                  </a:schemeClr>
+                </a:solidFill>
+              </a:rPr>
+              <a:t> </a:t>
+            </a:r>
+            <a:r>
+              <a:rPr lang="es-AR" sz="3000" dirty="0">
+                <a:solidFill>
+                  <a:schemeClr val="tx1">
+                    <a:lumMod val="75000"/>
+                    <a:lumOff val="25000"/>
+                  </a:schemeClr>
+                </a:solidFill>
+              </a:rPr>
+              <a:t>&amp;</a:t>
+            </a:r>
+            <a:r>
+              <a:rPr lang="es-AR" sz="3000" dirty="0" err="1">
+                <a:solidFill>
+                  <a:schemeClr val="tx1">
+                    <a:lumMod val="75000"/>
+                    <a:lumOff val="25000"/>
+                  </a:schemeClr>
+                </a:solidFill>
+              </a:rPr>
+              <a:t>Oacute</a:t>
+            </a:r>
+            <a:r>
+              <a:rPr lang="es-AR" sz="3000" dirty="0">
+                <a:solidFill>
+                  <a:schemeClr val="tx1">
+                    <a:lumMod val="75000"/>
+                    <a:lumOff val="25000"/>
+                  </a:schemeClr>
+                </a:solidFill>
+              </a:rPr>
+              <a:t>; </a:t>
+            </a:r>
+            <a:r>
+              <a:rPr lang="es-AR" sz="3000" dirty="0">
+                <a:solidFill>
+                  <a:schemeClr val="tx1">
+                    <a:tint val="75000"/>
+                  </a:schemeClr>
+                </a:solidFill>
+              </a:rPr>
+              <a:t>Ú </a:t>
+            </a:r>
+            <a:r>
+              <a:rPr lang="es-AR" sz="3000" dirty="0">
+                <a:solidFill>
+                  <a:schemeClr val="tx1">
+                    <a:lumMod val="75000"/>
+                    <a:lumOff val="25000"/>
+                  </a:schemeClr>
+                </a:solidFill>
+              </a:rPr>
+              <a:t>&amp;</a:t>
+            </a:r>
+            <a:r>
+              <a:rPr lang="es-AR" sz="3000" dirty="0" err="1">
+                <a:solidFill>
+                  <a:schemeClr val="tx1">
+                    <a:lumMod val="75000"/>
+                    <a:lumOff val="25000"/>
+                  </a:schemeClr>
+                </a:solidFill>
+              </a:rPr>
+              <a:t>Uacute</a:t>
+            </a:r>
+            <a:r>
+              <a:rPr lang="es-AR" sz="3000" dirty="0">
+                <a:solidFill>
+                  <a:schemeClr val="tx1">
+                    <a:lumMod val="75000"/>
+                    <a:lumOff val="25000"/>
+                  </a:schemeClr>
+                </a:solidFill>
+              </a:rPr>
+              <a:t>;</a:t>
+            </a:r>
+          </a:p>
+          <a:p>
+            <a:pPr marL="0" indent="0">
+              <a:buNone/>
+            </a:pPr>
+            <a:r>
+              <a:rPr lang="es-AR" sz="3000" dirty="0">
+                <a:solidFill>
+                  <a:schemeClr val="tx1">
+                    <a:tint val="75000"/>
+                  </a:schemeClr>
+                </a:solidFill>
+              </a:rPr>
+              <a:t> ñ </a:t>
+            </a:r>
+            <a:r>
+              <a:rPr lang="es-AR" sz="3000" dirty="0">
+                <a:solidFill>
+                  <a:schemeClr val="tx1">
+                    <a:lumMod val="75000"/>
+                    <a:lumOff val="25000"/>
+                  </a:schemeClr>
+                </a:solidFill>
+              </a:rPr>
+              <a:t>&amp;</a:t>
+            </a:r>
+            <a:r>
+              <a:rPr lang="es-AR" sz="3000" dirty="0" err="1">
+                <a:solidFill>
+                  <a:schemeClr val="tx1">
+                    <a:lumMod val="75000"/>
+                    <a:lumOff val="25000"/>
+                  </a:schemeClr>
+                </a:solidFill>
+              </a:rPr>
+              <a:t>ntilde</a:t>
+            </a:r>
+            <a:r>
+              <a:rPr lang="es-AR" sz="3000" dirty="0">
+                <a:solidFill>
+                  <a:schemeClr val="tx1">
+                    <a:lumMod val="75000"/>
+                    <a:lumOff val="25000"/>
+                  </a:schemeClr>
+                </a:solidFill>
+              </a:rPr>
+              <a:t>; </a:t>
+            </a:r>
+            <a:r>
+              <a:rPr lang="es-AR" sz="3000" dirty="0">
+                <a:solidFill>
+                  <a:schemeClr val="tx1">
+                    <a:tint val="75000"/>
+                  </a:schemeClr>
+                </a:solidFill>
+              </a:rPr>
+              <a:t>Ñ </a:t>
+            </a:r>
+            <a:r>
+              <a:rPr lang="es-AR" sz="3000" dirty="0">
+                <a:solidFill>
+                  <a:schemeClr val="tx1">
+                    <a:lumMod val="75000"/>
+                    <a:lumOff val="25000"/>
+                  </a:schemeClr>
+                </a:solidFill>
+              </a:rPr>
+              <a:t>&amp;</a:t>
+            </a:r>
+            <a:r>
+              <a:rPr lang="es-AR" sz="3000" dirty="0" err="1">
+                <a:solidFill>
+                  <a:schemeClr val="tx1">
+                    <a:lumMod val="75000"/>
+                    <a:lumOff val="25000"/>
+                  </a:schemeClr>
+                </a:solidFill>
+              </a:rPr>
+              <a:t>Ñtilde</a:t>
+            </a:r>
+            <a:r>
+              <a:rPr lang="es-AR" sz="3000" dirty="0">
+                <a:solidFill>
+                  <a:schemeClr val="tx1">
+                    <a:lumMod val="75000"/>
+                    <a:lumOff val="25000"/>
+                  </a:schemeClr>
+                </a:solidFill>
+              </a:rPr>
+              <a:t>;</a:t>
+            </a:r>
+          </a:p>
+          <a:p>
+            <a:pPr marL="0" indent="0">
+              <a:buNone/>
+            </a:pPr>
+            <a:r>
+              <a:rPr lang="es-AR" sz="3000" dirty="0">
+                <a:solidFill>
+                  <a:schemeClr val="tx1">
+                    <a:tint val="75000"/>
+                  </a:schemeClr>
+                </a:solidFill>
+              </a:rPr>
+              <a:t>La lista completa se consigue </a:t>
+            </a:r>
+            <a:r>
+              <a:rPr lang="es-AR" sz="3000" dirty="0" err="1">
+                <a:solidFill>
+                  <a:schemeClr val="tx1">
+                    <a:tint val="75000"/>
+                  </a:schemeClr>
+                </a:solidFill>
+              </a:rPr>
+              <a:t>en:https</a:t>
+            </a:r>
+            <a:r>
+              <a:rPr lang="es-AR" sz="3000" dirty="0">
+                <a:solidFill>
+                  <a:schemeClr val="tx1">
+                    <a:tint val="75000"/>
+                  </a:schemeClr>
+                </a:solidFill>
+              </a:rPr>
+              <a:t>://dev.w3.org/html5/</a:t>
+            </a:r>
+            <a:r>
+              <a:rPr lang="es-AR" sz="3000" dirty="0" err="1">
+                <a:solidFill>
+                  <a:schemeClr val="tx1">
+                    <a:tint val="75000"/>
+                  </a:schemeClr>
+                </a:solidFill>
+              </a:rPr>
+              <a:t>html-author</a:t>
+            </a:r>
+            <a:r>
+              <a:rPr lang="es-AR" sz="3000" dirty="0">
+                <a:solidFill>
+                  <a:schemeClr val="tx1">
+                    <a:tint val="75000"/>
+                  </a:schemeClr>
+                </a:solidFill>
+              </a:rPr>
+              <a:t>/</a:t>
+            </a:r>
+            <a:r>
+              <a:rPr lang="es-AR" sz="3000" dirty="0" err="1">
+                <a:solidFill>
+                  <a:schemeClr val="tx1">
+                    <a:tint val="75000"/>
+                  </a:schemeClr>
+                </a:solidFill>
+              </a:rPr>
+              <a:t>charref</a:t>
+            </a:r>
+            <a:endParaRPr lang="es-AR" sz="3000" dirty="0">
+              <a:solidFill>
+                <a:schemeClr val="tx1">
+                  <a:tint val="75000"/>
+                </a:schemeClr>
+              </a:solidFill>
+            </a:endParaRPr>
+          </a:p>
+          <a:p>
+            <a:pPr marL="0" indent="0">
+              <a:buNone/>
+            </a:pPr>
+            <a:r>
+              <a:rPr lang="es-AR" dirty="0">
+                <a:solidFill>
+                  <a:schemeClr val="tx1">
+                    <a:tint val="75000"/>
+                  </a:schemeClr>
+                </a:solidFill>
+              </a:rPr>
+              <a:t> </a:t>
+            </a:r>
+          </a:p>
+          <a:p>
+            <a:endParaRPr lang="es-AR" dirty="0"/>
+          </a:p>
+        </p:txBody>
+      </p:sp>
+    </p:spTree>
+    <p:extLst>
+      <p:ext uri="{BB962C8B-B14F-4D97-AF65-F5344CB8AC3E}">
+        <p14:creationId xmlns:p14="http://schemas.microsoft.com/office/powerpoint/2010/main" val="1415387639"/>
+      </p:ext>
+    </p:extLst>
+  </p:cSld>
+  <p:clrMapOvr>
+    <a:masterClrMapping/>
+  </p:clrMapOvr>
+</p:sld>
+</file>
+
+<file path=ppt/slides/slide7.xml><?xml version="1.0" encoding="utf-8"?>
+<p:sld xmlns:a="http://schemas.openxmlformats.org/drawingml/2006/main" xmlns:r="http://schemas.openxmlformats.org/officeDocument/2006/relationships" xmlns:p="http://schemas.openxmlformats.org/presentationml/2006/main">
+  <p:cSld>
+    <p:spTree>
+      <p:nvGrpSpPr>
+        <p:cNvPr id="1" name=""/>
+        <p:cNvGrpSpPr/>
+        <p:nvPr/>
+      </p:nvGrpSpPr>
+      <p:grpSpPr>
+        <a:xfrm>
+          <a:off x="0" y="0"/>
+          <a:ext cx="0" cy="0"/>
+          <a:chOff x="0" y="0"/>
+          <a:chExt cx="0" cy="0"/>
+        </a:xfrm>
+      </p:grpSpPr>
+      <p:sp>
+        <p:nvSpPr>
+          <p:cNvPr id="4" name="CuadroTexto 3">
+            <a:extLst>
+              <a:ext uri="{FF2B5EF4-FFF2-40B4-BE49-F238E27FC236}">
+                <a16:creationId xmlns:a16="http://schemas.microsoft.com/office/drawing/2014/main" id="{023422EE-87AE-4521-ABE6-BA7FA008B2D2}"/>
+              </a:ext>
+            </a:extLst>
+          </p:cNvPr>
+          <p:cNvSpPr txBox="1"/>
+          <p:nvPr/>
+        </p:nvSpPr>
+        <p:spPr>
+          <a:xfrm>
+            <a:off x="228601" y="135791"/>
+            <a:ext cx="11828720" cy="6586418"/>
+          </a:xfrm>
+          <a:prstGeom prst="rect">
+            <a:avLst/>
+          </a:prstGeom>
+          <a:noFill/>
+        </p:spPr>
+        <p:txBody>
+          <a:bodyPr wrap="square" rtlCol="0">
+            <a:spAutoFit/>
+          </a:bodyPr>
+          <a:lstStyle/>
+          <a:p>
+            <a:pPr algn="ctr"/>
+            <a:r>
+              <a:rPr lang="es-AR" sz="4000" u="sng" dirty="0">
+                <a:solidFill>
+                  <a:schemeClr val="tx1">
+                    <a:lumMod val="65000"/>
+                    <a:lumOff val="35000"/>
+                  </a:schemeClr>
+                </a:solidFill>
+                <a:latin typeface="+mj-lt"/>
+                <a:ea typeface="+mj-ea"/>
+                <a:cs typeface="+mj-cs"/>
+              </a:rPr>
+              <a:t>URL( </a:t>
+            </a:r>
+            <a:r>
+              <a:rPr lang="es-AR" sz="4000" u="sng" dirty="0" err="1">
+                <a:solidFill>
+                  <a:schemeClr val="tx1">
+                    <a:lumMod val="65000"/>
+                    <a:lumOff val="35000"/>
+                  </a:schemeClr>
+                </a:solidFill>
+                <a:latin typeface="+mj-lt"/>
+                <a:ea typeface="+mj-ea"/>
+                <a:cs typeface="+mj-cs"/>
+              </a:rPr>
+              <a:t>Uniform</a:t>
+            </a:r>
+            <a:r>
+              <a:rPr lang="es-AR" sz="4000" u="sng" dirty="0">
+                <a:solidFill>
+                  <a:schemeClr val="tx1">
+                    <a:lumMod val="65000"/>
+                    <a:lumOff val="35000"/>
+                  </a:schemeClr>
+                </a:solidFill>
+                <a:latin typeface="+mj-lt"/>
+                <a:ea typeface="+mj-ea"/>
+                <a:cs typeface="+mj-cs"/>
+              </a:rPr>
+              <a:t> </a:t>
+            </a:r>
+            <a:r>
+              <a:rPr lang="es-AR" sz="4000" u="sng" dirty="0" err="1">
+                <a:solidFill>
+                  <a:schemeClr val="tx1">
+                    <a:lumMod val="65000"/>
+                    <a:lumOff val="35000"/>
+                  </a:schemeClr>
+                </a:solidFill>
+                <a:latin typeface="+mj-lt"/>
+                <a:ea typeface="+mj-ea"/>
+                <a:cs typeface="+mj-cs"/>
+              </a:rPr>
+              <a:t>Resource</a:t>
+            </a:r>
+            <a:r>
+              <a:rPr lang="es-AR" sz="4000" u="sng" dirty="0">
+                <a:solidFill>
+                  <a:schemeClr val="tx1">
+                    <a:lumMod val="65000"/>
+                    <a:lumOff val="35000"/>
+                  </a:schemeClr>
+                </a:solidFill>
+                <a:latin typeface="+mj-lt"/>
+                <a:ea typeface="+mj-ea"/>
+                <a:cs typeface="+mj-cs"/>
+              </a:rPr>
+              <a:t> </a:t>
+            </a:r>
+            <a:r>
+              <a:rPr lang="es-AR" sz="4000" u="sng" dirty="0" err="1">
+                <a:solidFill>
+                  <a:schemeClr val="tx1">
+                    <a:lumMod val="65000"/>
+                    <a:lumOff val="35000"/>
+                  </a:schemeClr>
+                </a:solidFill>
+                <a:latin typeface="+mj-lt"/>
+                <a:ea typeface="+mj-ea"/>
+                <a:cs typeface="+mj-cs"/>
+              </a:rPr>
+              <a:t>Locator</a:t>
+            </a:r>
+            <a:r>
+              <a:rPr lang="es-AR" sz="4000" u="sng" dirty="0">
+                <a:solidFill>
+                  <a:schemeClr val="tx1">
+                    <a:lumMod val="65000"/>
+                    <a:lumOff val="35000"/>
+                  </a:schemeClr>
+                </a:solidFill>
+                <a:latin typeface="+mj-lt"/>
+                <a:ea typeface="+mj-ea"/>
+                <a:cs typeface="+mj-cs"/>
+              </a:rPr>
+              <a:t>)</a:t>
+            </a:r>
+          </a:p>
+          <a:p>
+            <a:pPr algn="ctr"/>
+            <a:endParaRPr lang="es-AR" dirty="0">
+              <a:solidFill>
+                <a:schemeClr val="tx1">
+                  <a:tint val="75000"/>
+                </a:schemeClr>
+              </a:solidFill>
+            </a:endParaRPr>
+          </a:p>
+          <a:p>
+            <a:r>
+              <a:rPr lang="es-AR" sz="2800" dirty="0">
+                <a:solidFill>
+                  <a:schemeClr val="tx1">
+                    <a:tint val="75000"/>
+                  </a:schemeClr>
+                </a:solidFill>
+              </a:rPr>
+              <a:t>Cumple dos funciones:</a:t>
+            </a:r>
+          </a:p>
+          <a:p>
+            <a:pPr marL="571500" indent="-571500">
+              <a:buFont typeface="Arial" panose="020B0604020202020204" pitchFamily="34" charset="0"/>
+              <a:buChar char="•"/>
+            </a:pPr>
+            <a:r>
+              <a:rPr lang="es-AR" sz="2800" dirty="0">
+                <a:solidFill>
+                  <a:schemeClr val="tx1">
+                    <a:tint val="75000"/>
+                  </a:schemeClr>
+                </a:solidFill>
+              </a:rPr>
+              <a:t>Identificar de forma única un recurso.</a:t>
+            </a:r>
+          </a:p>
+          <a:p>
+            <a:pPr marL="571500" indent="-571500">
+              <a:buFont typeface="Arial" panose="020B0604020202020204" pitchFamily="34" charset="0"/>
+              <a:buChar char="•"/>
+            </a:pPr>
+            <a:r>
+              <a:rPr lang="es-AR" sz="2800" dirty="0">
+                <a:solidFill>
+                  <a:schemeClr val="tx1">
+                    <a:tint val="75000"/>
+                  </a:schemeClr>
+                </a:solidFill>
+              </a:rPr>
+              <a:t>Permitir localizar ese recurso.</a:t>
+            </a:r>
+          </a:p>
+          <a:p>
+            <a:r>
+              <a:rPr lang="es-AR" sz="2800" dirty="0">
+                <a:solidFill>
+                  <a:schemeClr val="tx1">
+                    <a:tint val="75000"/>
+                  </a:schemeClr>
+                </a:solidFill>
+              </a:rPr>
+              <a:t>http://www.unsitio.com/carpeta/index.php?pagina=5&amp;nombre=Carlos#42</a:t>
+            </a:r>
+          </a:p>
+          <a:p>
+            <a:endParaRPr lang="es-AR" sz="2800" dirty="0">
+              <a:solidFill>
+                <a:schemeClr val="tx1">
+                  <a:tint val="75000"/>
+                </a:schemeClr>
+              </a:solidFill>
+            </a:endParaRPr>
+          </a:p>
+          <a:p>
+            <a:r>
+              <a:rPr lang="es-AR" sz="2800" dirty="0">
+                <a:solidFill>
+                  <a:schemeClr val="tx1">
+                    <a:tint val="75000"/>
+                  </a:schemeClr>
+                </a:solidFill>
+              </a:rPr>
+              <a:t>Una </a:t>
+            </a:r>
+            <a:r>
+              <a:rPr lang="es-AR" sz="2800" dirty="0" err="1">
+                <a:solidFill>
+                  <a:schemeClr val="tx1">
+                    <a:tint val="75000"/>
+                  </a:schemeClr>
+                </a:solidFill>
+              </a:rPr>
+              <a:t>url</a:t>
+            </a:r>
+            <a:r>
+              <a:rPr lang="es-AR" sz="2800" dirty="0">
+                <a:solidFill>
+                  <a:schemeClr val="tx1">
+                    <a:tint val="75000"/>
+                  </a:schemeClr>
+                </a:solidFill>
+              </a:rPr>
+              <a:t> puede tener hasta 5 componentes.</a:t>
+            </a:r>
+          </a:p>
+          <a:p>
+            <a:endParaRPr lang="es-AR" sz="2800" dirty="0">
+              <a:solidFill>
+                <a:schemeClr val="tx1">
+                  <a:tint val="75000"/>
+                </a:schemeClr>
+              </a:solidFill>
+            </a:endParaRPr>
+          </a:p>
+          <a:p>
+            <a:r>
+              <a:rPr lang="es-AR" sz="2800" dirty="0">
+                <a:solidFill>
+                  <a:schemeClr val="tx1">
+                    <a:tint val="75000"/>
+                  </a:schemeClr>
+                </a:solidFill>
+              </a:rPr>
+              <a:t>Protocolo: http:// puede ser https, </a:t>
+            </a:r>
+            <a:r>
+              <a:rPr lang="es-AR" sz="2800" dirty="0" err="1">
+                <a:solidFill>
+                  <a:schemeClr val="tx1">
+                    <a:tint val="75000"/>
+                  </a:schemeClr>
+                </a:solidFill>
+              </a:rPr>
+              <a:t>mailto</a:t>
+            </a:r>
+            <a:r>
+              <a:rPr lang="es-AR" sz="2800" dirty="0">
+                <a:solidFill>
+                  <a:schemeClr val="tx1">
+                    <a:tint val="75000"/>
+                  </a:schemeClr>
+                </a:solidFill>
+              </a:rPr>
+              <a:t>, file o ftp. </a:t>
+            </a:r>
+          </a:p>
+          <a:p>
+            <a:r>
+              <a:rPr lang="es-AR" sz="2800" dirty="0">
+                <a:solidFill>
+                  <a:schemeClr val="tx1">
+                    <a:tint val="75000"/>
+                  </a:schemeClr>
+                </a:solidFill>
+              </a:rPr>
+              <a:t>El servidor www.unsitio.com</a:t>
+            </a:r>
+          </a:p>
+          <a:p>
+            <a:r>
+              <a:rPr lang="es-AR" sz="2800" dirty="0">
+                <a:solidFill>
+                  <a:schemeClr val="tx1">
+                    <a:tint val="75000"/>
+                  </a:schemeClr>
+                </a:solidFill>
+              </a:rPr>
+              <a:t>La ruta /carpeta/</a:t>
+            </a:r>
+            <a:r>
+              <a:rPr lang="es-AR" sz="2800" dirty="0" err="1">
+                <a:solidFill>
+                  <a:schemeClr val="tx1">
+                    <a:tint val="75000"/>
+                  </a:schemeClr>
+                </a:solidFill>
+              </a:rPr>
+              <a:t>index.php</a:t>
+            </a:r>
+            <a:endParaRPr lang="es-AR" sz="2800" dirty="0">
+              <a:solidFill>
+                <a:schemeClr val="tx1">
+                  <a:tint val="75000"/>
+                </a:schemeClr>
+              </a:solidFill>
+            </a:endParaRPr>
+          </a:p>
+          <a:p>
+            <a:r>
+              <a:rPr lang="es-AR" sz="2800" dirty="0">
+                <a:solidFill>
+                  <a:schemeClr val="tx1">
+                    <a:tint val="75000"/>
+                  </a:schemeClr>
+                </a:solidFill>
+              </a:rPr>
+              <a:t>Consulta ?pagina=5&amp;nombre=Carlos Comienza con el símbolo ? Y continua con pares de atributo valor unidos por un =  </a:t>
+            </a:r>
+          </a:p>
+          <a:p>
+            <a:r>
+              <a:rPr lang="es-AR" sz="2800" dirty="0">
+                <a:solidFill>
+                  <a:schemeClr val="tx1">
+                    <a:tint val="75000"/>
+                  </a:schemeClr>
+                </a:solidFill>
+              </a:rPr>
+              <a:t>Sección lugar particular del documento.</a:t>
+            </a:r>
+          </a:p>
+        </p:txBody>
+      </p:sp>
+    </p:spTree>
+    <p:extLst>
+      <p:ext uri="{BB962C8B-B14F-4D97-AF65-F5344CB8AC3E}">
+        <p14:creationId xmlns:p14="http://schemas.microsoft.com/office/powerpoint/2010/main" val="30893028"/>
+      </p:ext>
+    </p:extLst>
+  </p:cSld>
+  <p:clrMapOvr>
+    <a:masterClrMapping/>
+  </p:clrMapOvr>
+</p:sld>
+</file>
+
+<file path=ppt/slides/slide8.xml><?xml version="1.0" encoding="utf-8"?>
+<p:sld xmlns:a="http://schemas.openxmlformats.org/drawingml/2006/main" xmlns:r="http://schemas.openxmlformats.org/officeDocument/2006/relationships" xmlns:p="http://schemas.openxmlformats.org/presentationml/2006/main">
+  <p:cSld>
+    <p:bg>
+      <p:bgRef idx="1001">
+        <a:schemeClr val="bg1"/>
+      </p:bgRef>
+    </p:bg>
+    <p:spTree>
+      <p:nvGrpSpPr>
+        <p:cNvPr id="1" name=""/>
+        <p:cNvGrpSpPr/>
+        <p:nvPr/>
+      </p:nvGrpSpPr>
+      <p:grpSpPr>
+        <a:xfrm>
+          <a:off x="0" y="0"/>
+          <a:ext cx="0" cy="0"/>
+          <a:chOff x="0" y="0"/>
+          <a:chExt cx="0" cy="0"/>
+        </a:xfrm>
+      </p:grpSpPr>
+      <p:sp>
+        <p:nvSpPr>
+          <p:cNvPr id="2" name="CuadroTexto 1">
+            <a:extLst>
+              <a:ext uri="{FF2B5EF4-FFF2-40B4-BE49-F238E27FC236}">
+                <a16:creationId xmlns:a16="http://schemas.microsoft.com/office/drawing/2014/main" id="{B6CF7403-06AC-4F91-8686-F55339114E9A}"/>
+              </a:ext>
+            </a:extLst>
+          </p:cNvPr>
+          <p:cNvSpPr txBox="1"/>
+          <p:nvPr/>
+        </p:nvSpPr>
+        <p:spPr>
+          <a:xfrm>
+            <a:off x="0" y="95693"/>
+            <a:ext cx="11961627" cy="5878532"/>
+          </a:xfrm>
+          <a:prstGeom prst="rect">
+            <a:avLst/>
+          </a:prstGeom>
+          <a:noFill/>
+        </p:spPr>
+        <p:txBody>
+          <a:bodyPr wrap="square" rtlCol="0">
+            <a:spAutoFit/>
+          </a:bodyPr>
+          <a:lstStyle/>
+          <a:p>
+            <a:pPr algn="ctr"/>
+            <a:r>
+              <a:rPr lang="es-AR" sz="4000" u="sng" dirty="0">
+                <a:solidFill>
+                  <a:schemeClr val="tx1">
+                    <a:lumMod val="65000"/>
+                    <a:lumOff val="35000"/>
+                  </a:schemeClr>
+                </a:solidFill>
+                <a:latin typeface="+mj-lt"/>
+                <a:ea typeface="+mj-ea"/>
+                <a:cs typeface="+mj-cs"/>
+              </a:rPr>
+              <a:t>Url absolutas y relativas</a:t>
+            </a:r>
+          </a:p>
+          <a:p>
+            <a:pPr algn="ctr"/>
+            <a:endParaRPr lang="es-AR" sz="2800" dirty="0">
+              <a:solidFill>
+                <a:schemeClr val="tx1">
+                  <a:tint val="75000"/>
+                </a:schemeClr>
+              </a:solidFill>
+            </a:endParaRPr>
+          </a:p>
+          <a:p>
+            <a:r>
+              <a:rPr lang="es-AR" sz="2800" dirty="0">
+                <a:solidFill>
+                  <a:schemeClr val="tx1">
+                    <a:tint val="75000"/>
+                  </a:schemeClr>
+                </a:solidFill>
+              </a:rPr>
+              <a:t>Las url absolutas son las que se escriben  completas, en las relativas se usa la información de la ubicación actual.</a:t>
+            </a:r>
+          </a:p>
+          <a:p>
+            <a:r>
+              <a:rPr lang="es-AR" sz="2800" dirty="0">
+                <a:solidFill>
+                  <a:schemeClr val="tx1">
+                    <a:tint val="75000"/>
+                  </a:schemeClr>
+                </a:solidFill>
+              </a:rPr>
+              <a:t>Siempre que se pueda, se debe usar las referencia relativa.</a:t>
+            </a:r>
+          </a:p>
+          <a:p>
+            <a:endParaRPr lang="es-AR" sz="2800" dirty="0">
+              <a:solidFill>
+                <a:schemeClr val="tx1">
+                  <a:tint val="75000"/>
+                </a:schemeClr>
+              </a:solidFill>
+            </a:endParaRPr>
+          </a:p>
+          <a:p>
+            <a:r>
+              <a:rPr lang="es-AR" sz="2800" dirty="0">
+                <a:solidFill>
+                  <a:schemeClr val="tx1">
+                    <a:tint val="75000"/>
+                  </a:schemeClr>
+                </a:solidFill>
+              </a:rPr>
+              <a:t>Ejemplo de referencia relativa.</a:t>
+            </a:r>
+          </a:p>
+          <a:p>
+            <a:endParaRPr lang="es-AR" sz="2800" dirty="0">
+              <a:solidFill>
+                <a:schemeClr val="tx1">
+                  <a:tint val="75000"/>
+                </a:schemeClr>
+              </a:solidFill>
+            </a:endParaRPr>
+          </a:p>
+          <a:p>
+            <a:r>
+              <a:rPr lang="es-AR" sz="2800" dirty="0">
+                <a:solidFill>
+                  <a:schemeClr val="tx1">
+                    <a:tint val="75000"/>
+                  </a:schemeClr>
+                </a:solidFill>
+              </a:rPr>
+              <a:t>“clases/persona.php”  ir a la carpeta clases y luego al archivo persona.php.</a:t>
+            </a:r>
+          </a:p>
+          <a:p>
+            <a:r>
+              <a:rPr lang="es-AR" sz="2800" dirty="0">
+                <a:solidFill>
+                  <a:schemeClr val="tx1">
+                    <a:tint val="75000"/>
+                  </a:schemeClr>
+                </a:solidFill>
+              </a:rPr>
+              <a:t>“../css/estilos.css” bajar un nivel a partir de ahí ir a la carpeta css y luego al archivo estilos.css.</a:t>
+            </a:r>
+          </a:p>
+          <a:p>
+            <a:r>
+              <a:rPr lang="es-AR" sz="2800" dirty="0">
+                <a:solidFill>
+                  <a:schemeClr val="tx1">
+                    <a:tint val="75000"/>
+                  </a:schemeClr>
+                </a:solidFill>
+              </a:rPr>
+              <a:t>“/index.php” ir a la raíz del sitio y luego al archivo index.php.</a:t>
+            </a:r>
+          </a:p>
+          <a:p>
+            <a:endParaRPr lang="es-AR" sz="2800" dirty="0">
+              <a:solidFill>
+                <a:schemeClr val="tx1">
+                  <a:tint val="75000"/>
+                </a:schemeClr>
+              </a:solidFill>
+            </a:endParaRPr>
+          </a:p>
+        </p:txBody>
+      </p:sp>
     </p:spTree>
     <p:extLst>
       <p:ext uri="{BB962C8B-B14F-4D97-AF65-F5344CB8AC3E}">
         <p14:creationId xmlns:p14="http://schemas.microsoft.com/office/powerpoint/2010/main" val="202375601"/>
+      </p:ext>
+    </p:extLst>
+  </p:cSld>
+  <p:clrMapOvr>
+    <a:overrideClrMapping bg1="lt1" tx1="dk1" bg2="lt2" tx2="dk2" accent1="accent1" accent2="accent2" accent3="accent3" accent4="accent4" accent5="accent5" accent6="accent6" hlink="hlink" folHlink="folHlink"/>
+  </p:clrMapOvr>
+</p:sld>
+</file>
+
+<file path=ppt/slides/slide9.xml><?xml version="1.0" encoding="utf-8"?>
+<p:sld xmlns:a="http://schemas.openxmlformats.org/drawingml/2006/main" xmlns:r="http://schemas.openxmlformats.org/officeDocument/2006/relationships" xmlns:p="http://schemas.openxmlformats.org/presentationml/2006/main">
+  <p:cSld>
+    <p:spTree>
+      <p:nvGrpSpPr>
+        <p:cNvPr id="1" name=""/>
+        <p:cNvGrpSpPr/>
+        <p:nvPr/>
+      </p:nvGrpSpPr>
+      <p:grpSpPr>
+        <a:xfrm>
+          <a:off x="0" y="0"/>
+          <a:ext cx="0" cy="0"/>
+          <a:chOff x="0" y="0"/>
+          <a:chExt cx="0" cy="0"/>
+        </a:xfrm>
+      </p:grpSpPr>
+      <p:sp>
+        <p:nvSpPr>
+          <p:cNvPr id="2" name="CuadroTexto 1">
+            <a:extLst>
+              <a:ext uri="{FF2B5EF4-FFF2-40B4-BE49-F238E27FC236}">
+                <a16:creationId xmlns:a16="http://schemas.microsoft.com/office/drawing/2014/main" id="{77722282-0C28-4B7C-9CDD-5ABAA6AB8D26}"/>
+              </a:ext>
+            </a:extLst>
+          </p:cNvPr>
+          <p:cNvSpPr txBox="1"/>
+          <p:nvPr/>
+        </p:nvSpPr>
+        <p:spPr>
+          <a:xfrm>
+            <a:off x="95693" y="170122"/>
+            <a:ext cx="12096307" cy="6001643"/>
+          </a:xfrm>
+          <a:prstGeom prst="rect">
+            <a:avLst/>
+          </a:prstGeom>
+          <a:noFill/>
+        </p:spPr>
+        <p:txBody>
+          <a:bodyPr wrap="square" rtlCol="0">
+            <a:spAutoFit/>
+          </a:bodyPr>
+          <a:lstStyle/>
+          <a:p>
+            <a:pPr algn="ctr"/>
+            <a:r>
+              <a:rPr lang="es-AR" sz="4000" u="sng" dirty="0">
+                <a:solidFill>
+                  <a:schemeClr val="tx1">
+                    <a:lumMod val="65000"/>
+                    <a:lumOff val="35000"/>
+                  </a:schemeClr>
+                </a:solidFill>
+                <a:latin typeface="+mj-lt"/>
+                <a:ea typeface="+mj-ea"/>
+                <a:cs typeface="+mj-cs"/>
+              </a:rPr>
+              <a:t>Enlaces Básicos</a:t>
+            </a:r>
+          </a:p>
+          <a:p>
+            <a:endParaRPr lang="es-AR" dirty="0"/>
+          </a:p>
+          <a:p>
+            <a:r>
+              <a:rPr lang="es-AR" sz="2800" dirty="0">
+                <a:solidFill>
+                  <a:schemeClr val="tx1">
+                    <a:tint val="75000"/>
+                  </a:schemeClr>
+                </a:solidFill>
+              </a:rPr>
+              <a:t>Para los enlaces se utiliza la etiqueta &lt;a&gt;, los atributos más importantes son href para indicar el destino y name que se utiliza para establecer el destino de un enlace.</a:t>
+            </a:r>
+          </a:p>
+          <a:p>
+            <a:r>
+              <a:rPr lang="es-AR" sz="2800" dirty="0">
+                <a:solidFill>
+                  <a:schemeClr val="tx1">
+                    <a:tint val="75000"/>
+                  </a:schemeClr>
+                </a:solidFill>
+              </a:rPr>
+              <a:t>Ejemplos de enlaces.</a:t>
+            </a:r>
+          </a:p>
+          <a:p>
+            <a:r>
+              <a:rPr lang="es-AR" sz="2800" dirty="0">
+                <a:solidFill>
+                  <a:schemeClr val="tx1">
+                    <a:lumMod val="75000"/>
+                    <a:lumOff val="25000"/>
+                  </a:schemeClr>
+                </a:solidFill>
+              </a:rPr>
+              <a:t>&lt;a href=“https://www.google.com” &gt; </a:t>
+            </a:r>
+            <a:r>
+              <a:rPr lang="es-AR" sz="2800" dirty="0">
+                <a:solidFill>
+                  <a:schemeClr val="tx1">
+                    <a:tint val="75000"/>
+                  </a:schemeClr>
+                </a:solidFill>
+              </a:rPr>
+              <a:t>google </a:t>
+            </a:r>
+            <a:r>
+              <a:rPr lang="es-AR" sz="2800" dirty="0">
+                <a:solidFill>
+                  <a:schemeClr val="tx1">
+                    <a:lumMod val="75000"/>
+                    <a:lumOff val="25000"/>
+                  </a:schemeClr>
+                </a:solidFill>
+              </a:rPr>
+              <a:t>&lt;/a&gt;</a:t>
+            </a:r>
+            <a:r>
+              <a:rPr lang="es-AR" sz="2800" dirty="0">
+                <a:solidFill>
+                  <a:schemeClr val="tx1">
+                    <a:tint val="75000"/>
+                  </a:schemeClr>
+                </a:solidFill>
+              </a:rPr>
+              <a:t> un vinculo externo.</a:t>
+            </a:r>
+          </a:p>
+          <a:p>
+            <a:pPr>
+              <a:lnSpc>
+                <a:spcPct val="70000"/>
+              </a:lnSpc>
+              <a:spcBef>
+                <a:spcPts val="1000"/>
+              </a:spcBef>
+            </a:pPr>
+            <a:r>
+              <a:rPr lang="es-AR" sz="2800" dirty="0">
+                <a:solidFill>
+                  <a:schemeClr val="tx1">
+                    <a:lumMod val="75000"/>
+                    <a:lumOff val="25000"/>
+                  </a:schemeClr>
+                </a:solidFill>
+              </a:rPr>
+              <a:t>&lt;a name=“inicio”&gt;&lt;/a&gt;</a:t>
+            </a:r>
+          </a:p>
+          <a:p>
+            <a:r>
+              <a:rPr lang="es-AR" sz="2800" dirty="0">
+                <a:solidFill>
+                  <a:schemeClr val="tx1">
+                    <a:lumMod val="75000"/>
+                    <a:lumOff val="25000"/>
+                  </a:schemeClr>
+                </a:solidFill>
+              </a:rPr>
+              <a:t>&lt;a href=“#inicio”&gt;Ir al inicio&lt;/a&gt; </a:t>
+            </a:r>
+            <a:r>
+              <a:rPr lang="es-AR" sz="2800" dirty="0">
+                <a:solidFill>
+                  <a:schemeClr val="tx1">
+                    <a:tint val="75000"/>
+                  </a:schemeClr>
+                </a:solidFill>
+              </a:rPr>
+              <a:t>Sirve para desplazarse dentro del mismo documento.</a:t>
+            </a:r>
+          </a:p>
+          <a:p>
+            <a:r>
+              <a:rPr lang="es-AR" sz="2800" dirty="0">
+                <a:solidFill>
+                  <a:schemeClr val="tx1">
+                    <a:tint val="75000"/>
+                  </a:schemeClr>
+                </a:solidFill>
+              </a:rPr>
+              <a:t>Dos enlaces muy usados.</a:t>
+            </a:r>
+          </a:p>
+          <a:p>
+            <a:pPr>
+              <a:lnSpc>
+                <a:spcPct val="70000"/>
+              </a:lnSpc>
+              <a:spcBef>
+                <a:spcPts val="1000"/>
+              </a:spcBef>
+            </a:pPr>
+            <a:r>
+              <a:rPr lang="es-AR" sz="2800" dirty="0">
+                <a:solidFill>
+                  <a:schemeClr val="tx1">
+                    <a:lumMod val="75000"/>
+                    <a:lumOff val="25000"/>
+                  </a:schemeClr>
+                </a:solidFill>
+              </a:rPr>
+              <a:t>&lt;script </a:t>
+            </a:r>
+            <a:r>
+              <a:rPr lang="es-AR" sz="2800" dirty="0" err="1">
+                <a:solidFill>
+                  <a:schemeClr val="tx1">
+                    <a:lumMod val="75000"/>
+                    <a:lumOff val="25000"/>
+                  </a:schemeClr>
+                </a:solidFill>
+              </a:rPr>
+              <a:t>type</a:t>
+            </a:r>
+            <a:r>
+              <a:rPr lang="es-AR" sz="2800" dirty="0">
+                <a:solidFill>
+                  <a:schemeClr val="tx1">
+                    <a:lumMod val="75000"/>
+                    <a:lumOff val="25000"/>
+                  </a:schemeClr>
+                </a:solidFill>
+              </a:rPr>
+              <a:t>=“</a:t>
+            </a:r>
+            <a:r>
+              <a:rPr lang="es-AR" sz="2800" dirty="0" err="1">
+                <a:solidFill>
+                  <a:schemeClr val="tx1">
+                    <a:lumMod val="75000"/>
+                    <a:lumOff val="25000"/>
+                  </a:schemeClr>
+                </a:solidFill>
+              </a:rPr>
+              <a:t>text</a:t>
+            </a:r>
+            <a:r>
+              <a:rPr lang="es-AR" sz="2800" dirty="0">
+                <a:solidFill>
+                  <a:schemeClr val="tx1">
+                    <a:lumMod val="75000"/>
+                    <a:lumOff val="25000"/>
+                  </a:schemeClr>
+                </a:solidFill>
+              </a:rPr>
+              <a:t>/</a:t>
+            </a:r>
+            <a:r>
+              <a:rPr lang="es-AR" sz="2800" dirty="0" err="1">
+                <a:solidFill>
+                  <a:schemeClr val="tx1">
+                    <a:lumMod val="75000"/>
+                    <a:lumOff val="25000"/>
+                  </a:schemeClr>
+                </a:solidFill>
+              </a:rPr>
+              <a:t>javascript</a:t>
+            </a:r>
+            <a:r>
+              <a:rPr lang="es-AR" sz="2800" dirty="0">
+                <a:solidFill>
+                  <a:schemeClr val="tx1">
+                    <a:lumMod val="75000"/>
+                    <a:lumOff val="25000"/>
+                  </a:schemeClr>
+                </a:solidFill>
+              </a:rPr>
+              <a:t>” </a:t>
+            </a:r>
+            <a:r>
+              <a:rPr lang="es-AR" sz="2800" dirty="0" err="1">
+                <a:solidFill>
+                  <a:schemeClr val="tx1">
+                    <a:lumMod val="75000"/>
+                    <a:lumOff val="25000"/>
+                  </a:schemeClr>
+                </a:solidFill>
+              </a:rPr>
+              <a:t>src</a:t>
+            </a:r>
+            <a:r>
+              <a:rPr lang="es-AR" sz="2800" dirty="0">
+                <a:solidFill>
+                  <a:schemeClr val="tx1">
+                    <a:lumMod val="75000"/>
+                    <a:lumOff val="25000"/>
+                  </a:schemeClr>
+                </a:solidFill>
+              </a:rPr>
+              <a:t>=“</a:t>
+            </a:r>
+            <a:r>
+              <a:rPr lang="es-AR" sz="2800" dirty="0" err="1">
+                <a:solidFill>
+                  <a:schemeClr val="tx1">
+                    <a:lumMod val="75000"/>
+                    <a:lumOff val="25000"/>
+                  </a:schemeClr>
+                </a:solidFill>
+              </a:rPr>
+              <a:t>js</a:t>
+            </a:r>
+            <a:r>
+              <a:rPr lang="es-AR" sz="2800" dirty="0">
+                <a:solidFill>
+                  <a:schemeClr val="tx1">
+                    <a:lumMod val="75000"/>
+                    <a:lumOff val="25000"/>
+                  </a:schemeClr>
+                </a:solidFill>
+              </a:rPr>
+              <a:t>/código.js”&gt;&lt;/script&gt;</a:t>
+            </a:r>
+          </a:p>
+          <a:p>
+            <a:pPr>
+              <a:lnSpc>
+                <a:spcPct val="70000"/>
+              </a:lnSpc>
+              <a:spcBef>
+                <a:spcPts val="1000"/>
+              </a:spcBef>
+            </a:pPr>
+            <a:r>
+              <a:rPr lang="es-AR" sz="2800" dirty="0">
+                <a:solidFill>
+                  <a:schemeClr val="tx1">
+                    <a:lumMod val="75000"/>
+                    <a:lumOff val="25000"/>
+                  </a:schemeClr>
+                </a:solidFill>
+              </a:rPr>
+              <a:t>&lt;link </a:t>
+            </a:r>
+            <a:r>
+              <a:rPr lang="es-AR" sz="2800" dirty="0" err="1">
+                <a:solidFill>
+                  <a:schemeClr val="tx1">
+                    <a:lumMod val="75000"/>
+                    <a:lumOff val="25000"/>
+                  </a:schemeClr>
+                </a:solidFill>
+              </a:rPr>
+              <a:t>rel</a:t>
+            </a:r>
+            <a:r>
+              <a:rPr lang="es-AR" sz="2800" dirty="0">
+                <a:solidFill>
+                  <a:schemeClr val="tx1">
+                    <a:lumMod val="75000"/>
+                    <a:lumOff val="25000"/>
+                  </a:schemeClr>
+                </a:solidFill>
+              </a:rPr>
+              <a:t>=“</a:t>
+            </a:r>
+            <a:r>
+              <a:rPr lang="es-AR" sz="2800" dirty="0" err="1">
+                <a:solidFill>
+                  <a:schemeClr val="tx1">
+                    <a:lumMod val="75000"/>
+                    <a:lumOff val="25000"/>
+                  </a:schemeClr>
+                </a:solidFill>
+              </a:rPr>
+              <a:t>stylesheet</a:t>
+            </a:r>
+            <a:r>
+              <a:rPr lang="es-AR" sz="2800" dirty="0">
+                <a:solidFill>
+                  <a:schemeClr val="tx1">
+                    <a:lumMod val="75000"/>
+                    <a:lumOff val="25000"/>
+                  </a:schemeClr>
+                </a:solidFill>
+              </a:rPr>
+              <a:t>” </a:t>
+            </a:r>
+            <a:r>
+              <a:rPr lang="es-AR" sz="2800" dirty="0" err="1">
+                <a:solidFill>
+                  <a:schemeClr val="tx1">
+                    <a:lumMod val="75000"/>
+                    <a:lumOff val="25000"/>
+                  </a:schemeClr>
+                </a:solidFill>
+              </a:rPr>
+              <a:t>type</a:t>
+            </a:r>
+            <a:r>
+              <a:rPr lang="es-AR" sz="2800" dirty="0">
+                <a:solidFill>
+                  <a:schemeClr val="tx1">
+                    <a:lumMod val="75000"/>
+                    <a:lumOff val="25000"/>
+                  </a:schemeClr>
+                </a:solidFill>
+              </a:rPr>
+              <a:t>=“</a:t>
+            </a:r>
+            <a:r>
+              <a:rPr lang="es-AR" sz="2800" dirty="0" err="1">
+                <a:solidFill>
+                  <a:schemeClr val="tx1">
+                    <a:lumMod val="75000"/>
+                    <a:lumOff val="25000"/>
+                  </a:schemeClr>
+                </a:solidFill>
+              </a:rPr>
+              <a:t>text</a:t>
+            </a:r>
+            <a:r>
+              <a:rPr lang="es-AR" sz="2800" dirty="0">
+                <a:solidFill>
+                  <a:schemeClr val="tx1">
+                    <a:lumMod val="75000"/>
+                    <a:lumOff val="25000"/>
+                  </a:schemeClr>
+                </a:solidFill>
+              </a:rPr>
+              <a:t>/css” href=“css/estilos.css”&gt;</a:t>
+            </a:r>
+          </a:p>
+          <a:p>
+            <a:endParaRPr lang="es-AR" dirty="0"/>
+          </a:p>
+        </p:txBody>
+      </p:sp>
+    </p:spTree>
+    <p:extLst>
+      <p:ext uri="{BB962C8B-B14F-4D97-AF65-F5344CB8AC3E}">
+        <p14:creationId xmlns:p14="http://schemas.microsoft.com/office/powerpoint/2010/main" val="1613278485"/>
       </p:ext>
     </p:extLst>
   </p:cSld>
@@ -5852,4 +10303,47 @@
     </a:folHlink>
   </a:clrScheme>
 </a:themeOverride>
+</file>
+
+<file path=ppt/theme/themeOverride3.xml><?xml version="1.0" encoding="utf-8"?>
+<a:themeOverride xmlns:a="http://schemas.openxmlformats.org/drawingml/2006/main">
+  <a:clrScheme name="Office">
+    <a:dk1>
+      <a:sysClr val="windowText" lastClr="000000"/>
+    </a:dk1>
+    <a:lt1>
+      <a:sysClr val="window" lastClr="FFFFFF"/>
+    </a:lt1>
+    <a:dk2>
+      <a:srgbClr val="44546A"/>
+    </a:dk2>
+    <a:lt2>
+      <a:srgbClr val="E7E6E6"/>
+    </a:lt2>
+    <a:accent1>
+      <a:srgbClr val="4472C4"/>
+    </a:accent1>
+    <a:accent2>
+      <a:srgbClr val="ED7D31"/>
+    </a:accent2>
+    <a:accent3>
+      <a:srgbClr val="A5A5A5"/>
+    </a:accent3>
+    <a:accent4>
+      <a:srgbClr val="FFC000"/>
+    </a:accent4>
+    <a:accent5>
+      <a:srgbClr val="5B9BD5"/>
+    </a:accent5>
+    <a:accent6>
+      <a:srgbClr val="70AD47"/>
+    </a:accent6>
+    <a:hlink>
+      <a:srgbClr val="0563C1"/>
+    </a:hlink>
+    <a:folHlink>
+      <a:srgbClr val="954F72"/>
+    </a:folHlink>
+  </a:clrScheme>
+</a:themeOverride>
 </file>
</xml_diff>